<commit_message>
Update to presentation pages
</commit_message>
<xml_diff>
--- a/topic-02/Developer Stories.pptx
+++ b/topic-02/Developer Stories.pptx
@@ -15,6 +15,7 @@
     <p:sldId id="263" r:id="rId10"/>
     <p:sldId id="264" r:id="rId11"/>
     <p:sldId id="265" r:id="rId12"/>
+    <p:sldId id="266" r:id="rId13"/>
   </p:sldIdLst>
   <p:sldSz cx="10080625" cy="5670550"/>
   <p:notesSz cx="7559675" cy="10691813"/>
@@ -375,7 +376,7 @@
             <a:spAutoFit/>
           </a:bodyPr>
           <a:p>
-            <a:fld id="{7789C044-610D-41E4-A016-BC71CA997207}" type="author">
+            <a:fld id="{A3DAE913-5C55-4886-88F9-2AAB869D798D}" type="author">
               <a:rPr b="0" lang="en-GB" sz="1800" strike="noStrike" u="none">
                 <a:solidFill>
                   <a:srgbClr val="ffffff"/>
@@ -582,7 +583,7 @@
 </file>
 
 <file path=ppt/slideLayouts/slideLayout2.xml><?xml version="1.0" encoding="utf-8"?>
-<p:sldLayout xmlns:a="http://schemas.openxmlformats.org/drawingml/2006/main" xmlns:p="http://schemas.openxmlformats.org/presentationml/2006/main" xmlns:r="http://schemas.openxmlformats.org/officeDocument/2006/relationships" xmlns:p14="http://schemas.microsoft.com/office/powerpoint/2010/main" xmlns:p15="http://schemas.microsoft.com/office/powerpoint/2012/main" xmlns:mc="http://schemas.openxmlformats.org/markup-compatibility/2006" type="title" preserve="1">
+<p:sldLayout xmlns:a="http://schemas.openxmlformats.org/drawingml/2006/main" xmlns:p="http://schemas.openxmlformats.org/presentationml/2006/main" xmlns:r="http://schemas.openxmlformats.org/officeDocument/2006/relationships" xmlns:p14="http://schemas.microsoft.com/office/powerpoint/2010/main" xmlns:p15="http://schemas.microsoft.com/office/powerpoint/2012/main" xmlns:mc="http://schemas.openxmlformats.org/markup-compatibility/2006" type="tx" preserve="1">
   <p:cSld name="Portfolio">
     <p:bg>
       <p:bgPr>
@@ -935,7 +936,7 @@
             <a:spAutoFit/>
           </a:bodyPr>
           <a:p>
-            <a:fld id="{6FB61593-9E37-49A9-9697-4F4BB5D04D1D}" type="author">
+            <a:fld id="{667C313B-71B3-40EB-BBF6-21A33F741FC8}" type="author">
               <a:rPr b="0" lang="en-GB" sz="1800" strike="noStrike" u="none">
                 <a:solidFill>
                   <a:srgbClr val="ffffff"/>
@@ -1142,6 +1143,566 @@
 </file>
 
 <file path=ppt/slideLayouts/slideLayout3.xml><?xml version="1.0" encoding="utf-8"?>
+<p:sldLayout xmlns:a="http://schemas.openxmlformats.org/drawingml/2006/main" xmlns:p="http://schemas.openxmlformats.org/presentationml/2006/main" xmlns:r="http://schemas.openxmlformats.org/officeDocument/2006/relationships" xmlns:p14="http://schemas.microsoft.com/office/powerpoint/2010/main" xmlns:p15="http://schemas.microsoft.com/office/powerpoint/2012/main" xmlns:mc="http://schemas.openxmlformats.org/markup-compatibility/2006" type="title" preserve="1">
+  <p:cSld name="Portfolio">
+    <p:bg>
+      <p:bgPr>
+        <a:solidFill>
+          <a:srgbClr val="000000"/>
+        </a:solidFill>
+      </p:bgPr>
+    </p:bg>
+    <p:spTree>
+      <p:nvGrpSpPr>
+        <p:cNvPr id="1" name=""/>
+        <p:cNvGrpSpPr/>
+        <p:nvPr/>
+      </p:nvGrpSpPr>
+      <p:grpSpPr>
+        <a:xfrm>
+          <a:off x="0" y="0"/>
+          <a:ext cx="0" cy="0"/>
+          <a:chOff x="0" y="0"/>
+          <a:chExt cx="0" cy="0"/>
+        </a:xfrm>
+      </p:grpSpPr>
+      <p:sp>
+        <p:nvSpPr>
+          <p:cNvPr id="9" name="PlaceHolder 1"/>
+          <p:cNvSpPr>
+            <a:spLocks noGrp="1"/>
+          </p:cNvSpPr>
+          <p:nvPr>
+            <p:ph type="title"/>
+          </p:nvPr>
+        </p:nvSpPr>
+        <p:spPr>
+          <a:xfrm>
+            <a:off x="144000" y="3888000"/>
+            <a:ext cx="9000000" cy="658440"/>
+          </a:xfrm>
+          <a:prstGeom prst="rect">
+            <a:avLst/>
+          </a:prstGeom>
+          <a:noFill/>
+          <a:ln w="0">
+            <a:noFill/>
+          </a:ln>
+        </p:spPr>
+        <p:txBody>
+          <a:bodyPr lIns="0" rIns="0" tIns="0" bIns="0" anchor="ctr">
+            <a:noAutofit/>
+          </a:bodyPr>
+          <a:p>
+            <a:pPr indent="0">
+              <a:buNone/>
+            </a:pPr>
+            <a:r>
+              <a:rPr b="0" lang="en-GB" sz="4400" strike="noStrike" u="none">
+                <a:solidFill>
+                  <a:srgbClr val="ffffff"/>
+                </a:solidFill>
+                <a:effectLst/>
+                <a:uFillTx/>
+                <a:latin typeface="Arial"/>
+              </a:rPr>
+              <a:t>Click to edit the title text format</a:t>
+            </a:r>
+            <a:endParaRPr b="0" lang="en-GB" sz="4400" strike="noStrike" u="none">
+              <a:solidFill>
+                <a:srgbClr val="ffffff"/>
+              </a:solidFill>
+              <a:effectLst/>
+              <a:uFillTx/>
+              <a:latin typeface="Arial"/>
+            </a:endParaRPr>
+          </a:p>
+        </p:txBody>
+      </p:sp>
+      <p:sp>
+        <p:nvSpPr>
+          <p:cNvPr id="10" name="PlaceHolder 2"/>
+          <p:cNvSpPr>
+            <a:spLocks noGrp="1"/>
+          </p:cNvSpPr>
+          <p:nvPr>
+            <p:ph type="body"/>
+          </p:nvPr>
+        </p:nvSpPr>
+        <p:spPr>
+          <a:xfrm>
+            <a:off x="1584000" y="648000"/>
+            <a:ext cx="6480000" cy="2598840"/>
+          </a:xfrm>
+          <a:prstGeom prst="rect">
+            <a:avLst/>
+          </a:prstGeom>
+          <a:noFill/>
+          <a:ln w="0">
+            <a:noFill/>
+          </a:ln>
+        </p:spPr>
+        <p:txBody>
+          <a:bodyPr lIns="0" rIns="0" tIns="0" bIns="0" anchor="t">
+            <a:normAutofit fontScale="92500" lnSpcReduction="9999"/>
+          </a:bodyPr>
+          <a:p>
+            <a:pPr marL="432000" indent="-324000">
+              <a:spcBef>
+                <a:spcPts val="1417"/>
+              </a:spcBef>
+              <a:buClr>
+                <a:srgbClr val="ffffff"/>
+              </a:buClr>
+              <a:buSzPct val="45000"/>
+              <a:buFont typeface="Wingdings" charset="2"/>
+              <a:buChar char=""/>
+            </a:pPr>
+            <a:r>
+              <a:rPr b="0" lang="en-GB" sz="3200" strike="noStrike" u="none">
+                <a:solidFill>
+                  <a:srgbClr val="ffffff"/>
+                </a:solidFill>
+                <a:effectLst/>
+                <a:uFillTx/>
+                <a:latin typeface="Arial"/>
+              </a:rPr>
+              <a:t>Click to edit the outline text format</a:t>
+            </a:r>
+            <a:endParaRPr b="0" lang="en-GB" sz="3200" strike="noStrike" u="none">
+              <a:solidFill>
+                <a:srgbClr val="ffffff"/>
+              </a:solidFill>
+              <a:effectLst/>
+              <a:uFillTx/>
+              <a:latin typeface="Arial"/>
+            </a:endParaRPr>
+          </a:p>
+          <a:p>
+            <a:pPr lvl="1" marL="864000" indent="-324000">
+              <a:spcBef>
+                <a:spcPts val="1134"/>
+              </a:spcBef>
+              <a:buClr>
+                <a:srgbClr val="ffffff"/>
+              </a:buClr>
+              <a:buSzPct val="75000"/>
+              <a:buFont typeface="Symbol" charset="2"/>
+              <a:buChar char=""/>
+            </a:pPr>
+            <a:r>
+              <a:rPr b="0" lang="en-GB" sz="2800" strike="noStrike" u="none">
+                <a:solidFill>
+                  <a:srgbClr val="ffffff"/>
+                </a:solidFill>
+                <a:effectLst/>
+                <a:uFillTx/>
+                <a:latin typeface="Arial"/>
+              </a:rPr>
+              <a:t>Second Outline Level</a:t>
+            </a:r>
+            <a:endParaRPr b="0" lang="en-GB" sz="2800" strike="noStrike" u="none">
+              <a:solidFill>
+                <a:srgbClr val="ffffff"/>
+              </a:solidFill>
+              <a:effectLst/>
+              <a:uFillTx/>
+              <a:latin typeface="Arial"/>
+            </a:endParaRPr>
+          </a:p>
+          <a:p>
+            <a:pPr lvl="2" marL="1296000" indent="-288000">
+              <a:spcBef>
+                <a:spcPts val="850"/>
+              </a:spcBef>
+              <a:buClr>
+                <a:srgbClr val="ffffff"/>
+              </a:buClr>
+              <a:buSzPct val="45000"/>
+              <a:buFont typeface="Wingdings" charset="2"/>
+              <a:buChar char=""/>
+            </a:pPr>
+            <a:r>
+              <a:rPr b="0" lang="en-GB" sz="2400" strike="noStrike" u="none">
+                <a:solidFill>
+                  <a:srgbClr val="ffffff"/>
+                </a:solidFill>
+                <a:effectLst/>
+                <a:uFillTx/>
+                <a:latin typeface="Arial"/>
+              </a:rPr>
+              <a:t>Third Outline Level</a:t>
+            </a:r>
+            <a:endParaRPr b="0" lang="en-GB" sz="2400" strike="noStrike" u="none">
+              <a:solidFill>
+                <a:srgbClr val="ffffff"/>
+              </a:solidFill>
+              <a:effectLst/>
+              <a:uFillTx/>
+              <a:latin typeface="Arial"/>
+            </a:endParaRPr>
+          </a:p>
+          <a:p>
+            <a:pPr lvl="3" marL="1728000" indent="-216000">
+              <a:spcBef>
+                <a:spcPts val="567"/>
+              </a:spcBef>
+              <a:buClr>
+                <a:srgbClr val="ffffff"/>
+              </a:buClr>
+              <a:buSzPct val="75000"/>
+              <a:buFont typeface="Symbol" charset="2"/>
+              <a:buChar char=""/>
+            </a:pPr>
+            <a:r>
+              <a:rPr b="0" lang="en-GB" sz="2000" strike="noStrike" u="none">
+                <a:solidFill>
+                  <a:srgbClr val="ffffff"/>
+                </a:solidFill>
+                <a:effectLst/>
+                <a:uFillTx/>
+                <a:latin typeface="Arial"/>
+              </a:rPr>
+              <a:t>Fourth Outline Level</a:t>
+            </a:r>
+            <a:endParaRPr b="0" lang="en-GB" sz="2000" strike="noStrike" u="none">
+              <a:solidFill>
+                <a:srgbClr val="ffffff"/>
+              </a:solidFill>
+              <a:effectLst/>
+              <a:uFillTx/>
+              <a:latin typeface="Arial"/>
+            </a:endParaRPr>
+          </a:p>
+          <a:p>
+            <a:pPr lvl="4" marL="2160000" indent="-216000">
+              <a:spcBef>
+                <a:spcPts val="283"/>
+              </a:spcBef>
+              <a:buClr>
+                <a:srgbClr val="ffffff"/>
+              </a:buClr>
+              <a:buSzPct val="45000"/>
+              <a:buFont typeface="Wingdings" charset="2"/>
+              <a:buChar char=""/>
+            </a:pPr>
+            <a:r>
+              <a:rPr b="0" lang="en-GB" sz="2000" strike="noStrike" u="none">
+                <a:solidFill>
+                  <a:srgbClr val="ffffff"/>
+                </a:solidFill>
+                <a:effectLst/>
+                <a:uFillTx/>
+                <a:latin typeface="Arial"/>
+              </a:rPr>
+              <a:t>Fifth Outline Level</a:t>
+            </a:r>
+            <a:endParaRPr b="0" lang="en-GB" sz="2000" strike="noStrike" u="none">
+              <a:solidFill>
+                <a:srgbClr val="ffffff"/>
+              </a:solidFill>
+              <a:effectLst/>
+              <a:uFillTx/>
+              <a:latin typeface="Arial"/>
+            </a:endParaRPr>
+          </a:p>
+          <a:p>
+            <a:pPr lvl="5" marL="2592000" indent="-216000">
+              <a:spcBef>
+                <a:spcPts val="283"/>
+              </a:spcBef>
+              <a:buClr>
+                <a:srgbClr val="ffffff"/>
+              </a:buClr>
+              <a:buSzPct val="45000"/>
+              <a:buFont typeface="Wingdings" charset="2"/>
+              <a:buChar char=""/>
+            </a:pPr>
+            <a:r>
+              <a:rPr b="0" lang="en-GB" sz="2000" strike="noStrike" u="none">
+                <a:solidFill>
+                  <a:srgbClr val="ffffff"/>
+                </a:solidFill>
+                <a:effectLst/>
+                <a:uFillTx/>
+                <a:latin typeface="Arial"/>
+              </a:rPr>
+              <a:t>Sixth Outline Level</a:t>
+            </a:r>
+            <a:endParaRPr b="0" lang="en-GB" sz="2000" strike="noStrike" u="none">
+              <a:solidFill>
+                <a:srgbClr val="ffffff"/>
+              </a:solidFill>
+              <a:effectLst/>
+              <a:uFillTx/>
+              <a:latin typeface="Arial"/>
+            </a:endParaRPr>
+          </a:p>
+          <a:p>
+            <a:pPr lvl="6" marL="3024000" indent="-216000">
+              <a:spcBef>
+                <a:spcPts val="283"/>
+              </a:spcBef>
+              <a:buClr>
+                <a:srgbClr val="ffffff"/>
+              </a:buClr>
+              <a:buSzPct val="45000"/>
+              <a:buFont typeface="Wingdings" charset="2"/>
+              <a:buChar char=""/>
+            </a:pPr>
+            <a:r>
+              <a:rPr b="0" lang="en-GB" sz="2000" strike="noStrike" u="none">
+                <a:solidFill>
+                  <a:srgbClr val="ffffff"/>
+                </a:solidFill>
+                <a:effectLst/>
+                <a:uFillTx/>
+                <a:latin typeface="Arial"/>
+              </a:rPr>
+              <a:t>Seventh Outline Level</a:t>
+            </a:r>
+            <a:endParaRPr b="0" lang="en-GB" sz="2000" strike="noStrike" u="none">
+              <a:solidFill>
+                <a:srgbClr val="ffffff"/>
+              </a:solidFill>
+              <a:effectLst/>
+              <a:uFillTx/>
+              <a:latin typeface="Arial"/>
+            </a:endParaRPr>
+          </a:p>
+        </p:txBody>
+      </p:sp>
+      <p:sp>
+        <p:nvSpPr>
+          <p:cNvPr id="11" name=""/>
+          <p:cNvSpPr txBox="1"/>
+          <p:nvPr/>
+        </p:nvSpPr>
+        <p:spPr>
+          <a:xfrm>
+            <a:off x="4104000" y="4896000"/>
+            <a:ext cx="5760000" cy="346320"/>
+          </a:xfrm>
+          <a:prstGeom prst="rect">
+            <a:avLst/>
+          </a:prstGeom>
+          <a:noFill/>
+          <a:ln w="10800">
+            <a:noFill/>
+          </a:ln>
+        </p:spPr>
+        <p:txBody>
+          <a:bodyPr lIns="90000" rIns="90000" tIns="45000" bIns="45000" anchor="t">
+            <a:spAutoFit/>
+          </a:bodyPr>
+          <a:p>
+            <a:fld id="{462C1674-A5C1-4242-9588-3AB07ADB87E5}" type="author">
+              <a:rPr b="0" lang="en-GB" sz="1800" strike="noStrike" u="none">
+                <a:solidFill>
+                  <a:srgbClr val="ffffff"/>
+                </a:solidFill>
+                <a:effectLst/>
+                <a:uFillTx/>
+                <a:latin typeface="Arial"/>
+              </a:rPr>
+              <a:t> </a:t>
+            </a:fld>
+            <a:endParaRPr b="0" lang="en-GB" sz="1800" strike="noStrike" u="none">
+              <a:solidFill>
+                <a:srgbClr val="ffffff"/>
+              </a:solidFill>
+              <a:effectLst/>
+              <a:uFillTx/>
+              <a:latin typeface="Arial"/>
+            </a:endParaRPr>
+          </a:p>
+        </p:txBody>
+      </p:sp>
+      <p:sp>
+        <p:nvSpPr>
+          <p:cNvPr id="3" name=""/>
+          <p:cNvSpPr/>
+          <p:nvPr/>
+        </p:nvSpPr>
+        <p:spPr>
+          <a:xfrm>
+            <a:off x="25920" y="4628880"/>
+            <a:ext cx="6120000" cy="18000"/>
+          </a:xfrm>
+          <a:prstGeom prst="roundRect">
+            <a:avLst>
+              <a:gd name="adj" fmla="val 50000"/>
+            </a:avLst>
+          </a:prstGeom>
+          <a:gradFill rotWithShape="0">
+            <a:gsLst>
+              <a:gs pos="0">
+                <a:srgbClr val="cccccc"/>
+              </a:gs>
+              <a:gs pos="100000">
+                <a:srgbClr val="333333"/>
+              </a:gs>
+            </a:gsLst>
+            <a:lin ang="0"/>
+          </a:gradFill>
+          <a:ln w="10800">
+            <a:noFill/>
+          </a:ln>
+        </p:spPr>
+        <p:style>
+          <a:lnRef idx="0"/>
+          <a:fillRef idx="0"/>
+          <a:effectRef idx="0"/>
+          <a:fontRef idx="minor"/>
+        </p:style>
+        <p:txBody>
+          <a:bodyPr wrap="none" lIns="90000" rIns="90000" tIns="-32040" bIns="-32040" anchor="t">
+            <a:noAutofit/>
+          </a:bodyPr>
+          <a:p>
+            <a:endParaRPr b="0" lang="en-GB" sz="1800" strike="noStrike" u="none">
+              <a:solidFill>
+                <a:srgbClr val="ffffff"/>
+              </a:solidFill>
+              <a:effectLst/>
+              <a:uFillTx/>
+              <a:latin typeface="Arial"/>
+            </a:endParaRPr>
+          </a:p>
+        </p:txBody>
+      </p:sp>
+      <p:sp>
+        <p:nvSpPr>
+          <p:cNvPr id="4" name=""/>
+          <p:cNvSpPr/>
+          <p:nvPr/>
+        </p:nvSpPr>
+        <p:spPr>
+          <a:xfrm>
+            <a:off x="3859200" y="5324400"/>
+            <a:ext cx="6240240" cy="7200"/>
+          </a:xfrm>
+          <a:prstGeom prst="roundRect">
+            <a:avLst>
+              <a:gd name="adj" fmla="val 50000"/>
+            </a:avLst>
+          </a:prstGeom>
+          <a:gradFill rotWithShape="0">
+            <a:gsLst>
+              <a:gs pos="0">
+                <a:srgbClr val="cccccc"/>
+              </a:gs>
+              <a:gs pos="100000">
+                <a:srgbClr val="333333"/>
+              </a:gs>
+            </a:gsLst>
+            <a:lin ang="0"/>
+          </a:gradFill>
+          <a:ln w="10800">
+            <a:noFill/>
+          </a:ln>
+        </p:spPr>
+        <p:style>
+          <a:lnRef idx="0"/>
+          <a:fillRef idx="0"/>
+          <a:effectRef idx="0"/>
+          <a:fontRef idx="minor"/>
+        </p:style>
+        <p:txBody>
+          <a:bodyPr wrap="none" lIns="90000" rIns="90000" tIns="-39960" bIns="-39960" anchor="t">
+            <a:noAutofit/>
+          </a:bodyPr>
+          <a:p>
+            <a:endParaRPr b="0" lang="en-GB" sz="1800" strike="noStrike" u="none">
+              <a:solidFill>
+                <a:srgbClr val="ffffff"/>
+              </a:solidFill>
+              <a:effectLst/>
+              <a:uFillTx/>
+              <a:latin typeface="Arial"/>
+            </a:endParaRPr>
+          </a:p>
+        </p:txBody>
+      </p:sp>
+      <p:sp>
+        <p:nvSpPr>
+          <p:cNvPr id="5" name=""/>
+          <p:cNvSpPr/>
+          <p:nvPr/>
+        </p:nvSpPr>
+        <p:spPr>
+          <a:xfrm>
+            <a:off x="4044960" y="4944960"/>
+            <a:ext cx="7200" cy="487440"/>
+          </a:xfrm>
+          <a:custGeom>
+            <a:avLst/>
+            <a:gdLst>
+              <a:gd name="textAreaLeft" fmla="*/ 1080 w 7200"/>
+              <a:gd name="textAreaRight" fmla="*/ 6120 w 7200"/>
+              <a:gd name="textAreaTop" fmla="*/ 1080 h 487440"/>
+              <a:gd name="textAreaBottom" fmla="*/ 486360 h 487440"/>
+            </a:gdLst>
+            <a:ahLst/>
+            <a:cxnLst/>
+            <a:rect l="textAreaLeft" t="textAreaTop" r="textAreaRight" b="textAreaBottom"/>
+            <a:pathLst>
+              <a:path w="21600" h="1393714">
+                <a:moveTo>
+                  <a:pt x="10800" y="0"/>
+                </a:moveTo>
+                <a:arcTo wR="10800" hR="10800" stAng="16200000" swAng="-5400000"/>
+                <a:lnTo>
+                  <a:pt x="0" y="1382914"/>
+                </a:lnTo>
+                <a:arcTo wR="10800" hR="10800" stAng="10800000" swAng="-5400000"/>
+                <a:lnTo>
+                  <a:pt x="10800" y="1393714"/>
+                </a:lnTo>
+                <a:arcTo wR="10800" hR="10800" stAng="5400000" swAng="-5400000"/>
+                <a:lnTo>
+                  <a:pt x="21600" y="10800"/>
+                </a:lnTo>
+                <a:arcTo wR="10800" hR="10800" stAng="0" swAng="-5400000"/>
+                <a:close/>
+              </a:path>
+            </a:pathLst>
+          </a:custGeom>
+          <a:solidFill>
+            <a:srgbClr val="cccccc"/>
+          </a:solidFill>
+          <a:ln w="10800">
+            <a:noFill/>
+          </a:ln>
+        </p:spPr>
+        <p:style>
+          <a:lnRef idx="0"/>
+          <a:fillRef idx="0"/>
+          <a:effectRef idx="0"/>
+          <a:fontRef idx="minor"/>
+        </p:style>
+        <p:txBody>
+          <a:bodyPr wrap="none" lIns="90000" rIns="90000" tIns="45000" bIns="45000" anchor="t">
+            <a:noAutofit/>
+          </a:bodyPr>
+          <a:p>
+            <a:endParaRPr b="0" lang="en-GB" sz="1800" strike="noStrike" u="none">
+              <a:solidFill>
+                <a:srgbClr val="000000"/>
+              </a:solidFill>
+              <a:effectLst/>
+              <a:uFillTx/>
+              <a:latin typeface="Arial"/>
+            </a:endParaRPr>
+          </a:p>
+        </p:txBody>
+      </p:sp>
+    </p:spTree>
+  </p:cSld>
+</p:sldLayout>
+</file>
+
+<file path=ppt/slideLayouts/slideLayout4.xml><?xml version="1.0" encoding="utf-8"?>
 <p:sldLayout xmlns:a="http://schemas.openxmlformats.org/drawingml/2006/main" xmlns:p="http://schemas.openxmlformats.org/presentationml/2006/main" xmlns:r="http://schemas.openxmlformats.org/officeDocument/2006/relationships" xmlns:p14="http://schemas.microsoft.com/office/powerpoint/2010/main" xmlns:p15="http://schemas.microsoft.com/office/powerpoint/2012/main" xmlns:mc="http://schemas.openxmlformats.org/markup-compatibility/2006" type="twoObj" preserve="1">
   <p:cSld name="One Column">
     <p:bg>
@@ -1167,7 +1728,7 @@
       </p:grpSpPr>
       <p:sp>
         <p:nvSpPr>
-          <p:cNvPr id="19" name="PlaceHolder 1"/>
+          <p:cNvPr id="22" name="PlaceHolder 1"/>
           <p:cNvSpPr>
             <a:spLocks noGrp="1"/>
           </p:cNvSpPr>
@@ -1220,7 +1781,7 @@
       </p:sp>
       <p:sp>
         <p:nvSpPr>
-          <p:cNvPr id="20" name="PlaceHolder 2"/>
+          <p:cNvPr id="23" name="PlaceHolder 2"/>
           <p:cNvSpPr>
             <a:spLocks noGrp="1"/>
           </p:cNvSpPr>
@@ -1473,7 +2034,7 @@
       </p:sp>
       <p:sp>
         <p:nvSpPr>
-          <p:cNvPr id="21" name="PlaceHolder 3"/>
+          <p:cNvPr id="24" name="PlaceHolder 3"/>
           <p:cNvSpPr>
             <a:spLocks noGrp="1"/>
           </p:cNvSpPr>
@@ -1539,7 +2100,7 @@
       </p:sp>
       <p:sp>
         <p:nvSpPr>
-          <p:cNvPr id="22" name="PlaceHolder 4"/>
+          <p:cNvPr id="25" name="PlaceHolder 4"/>
           <p:cNvSpPr>
             <a:spLocks noGrp="1"/>
           </p:cNvSpPr>
@@ -1605,7 +2166,7 @@
       </p:sp>
       <p:sp>
         <p:nvSpPr>
-          <p:cNvPr id="23" name="PlaceHolder 5"/>
+          <p:cNvPr id="26" name="PlaceHolder 5"/>
           <p:cNvSpPr>
             <a:spLocks noGrp="1"/>
           </p:cNvSpPr>
@@ -1647,7 +2208,7 @@
             <a:pPr indent="0" algn="r">
               <a:buNone/>
             </a:pPr>
-            <a:fld id="{551710DA-D63C-42D3-AB31-42BF003A1D36}" type="slidenum">
+            <a:fld id="{CD2A83FB-074E-4385-93DE-1B18C9CA5867}" type="slidenum">
               <a:rPr b="0" lang="en-GB" sz="1400" strike="noStrike" u="none">
                 <a:solidFill>
                   <a:srgbClr val="ffffff"/>
@@ -1671,7 +2232,7 @@
       </p:sp>
       <p:sp>
         <p:nvSpPr>
-          <p:cNvPr id="14" name=""/>
+          <p:cNvPr id="17" name=""/>
           <p:cNvSpPr/>
           <p:nvPr/>
         </p:nvSpPr>
@@ -1724,7 +2285,7 @@
       </p:sp>
       <p:sp>
         <p:nvSpPr>
-          <p:cNvPr id="15" name=""/>
+          <p:cNvPr id="18" name=""/>
           <p:cNvSpPr/>
           <p:nvPr/>
         </p:nvSpPr>
@@ -1777,7 +2338,7 @@
       </p:sp>
       <p:sp>
         <p:nvSpPr>
-          <p:cNvPr id="16" name=""/>
+          <p:cNvPr id="19" name=""/>
           <p:cNvSpPr/>
           <p:nvPr/>
         </p:nvSpPr>
@@ -1850,7 +2411,7 @@
       </p:sp>
       <p:sp>
         <p:nvSpPr>
-          <p:cNvPr id="17" name=""/>
+          <p:cNvPr id="20" name=""/>
           <p:cNvSpPr/>
           <p:nvPr/>
         </p:nvSpPr>
@@ -1903,7 +2464,7 @@
       </p:sp>
       <p:sp>
         <p:nvSpPr>
-          <p:cNvPr id="18" name=""/>
+          <p:cNvPr id="21" name=""/>
           <p:cNvSpPr/>
           <p:nvPr/>
         </p:nvSpPr>
@@ -1979,7 +2540,7 @@
 </p:sldLayout>
 </file>
 
-<file path=ppt/slideLayouts/slideLayout4.xml><?xml version="1.0" encoding="utf-8"?>
+<file path=ppt/slideLayouts/slideLayout5.xml><?xml version="1.0" encoding="utf-8"?>
 <p:sldLayout xmlns:a="http://schemas.openxmlformats.org/drawingml/2006/main" xmlns:p="http://schemas.openxmlformats.org/presentationml/2006/main" xmlns:r="http://schemas.openxmlformats.org/officeDocument/2006/relationships" xmlns:p14="http://schemas.microsoft.com/office/powerpoint/2010/main" xmlns:p15="http://schemas.microsoft.com/office/powerpoint/2012/main" xmlns:mc="http://schemas.openxmlformats.org/markup-compatibility/2006" type="tx" preserve="1">
   <p:cSld name="One Column">
     <p:bg>
@@ -2005,7 +2566,7 @@
       </p:grpSpPr>
       <p:sp>
         <p:nvSpPr>
-          <p:cNvPr id="9" name="PlaceHolder 1"/>
+          <p:cNvPr id="12" name="PlaceHolder 1"/>
           <p:cNvSpPr>
             <a:spLocks noGrp="1"/>
           </p:cNvSpPr>
@@ -2058,7 +2619,7 @@
       </p:sp>
       <p:sp>
         <p:nvSpPr>
-          <p:cNvPr id="10" name="PlaceHolder 2"/>
+          <p:cNvPr id="13" name="PlaceHolder 2"/>
           <p:cNvSpPr>
             <a:spLocks noGrp="1"/>
           </p:cNvSpPr>
@@ -2311,7 +2872,7 @@
       </p:sp>
       <p:sp>
         <p:nvSpPr>
-          <p:cNvPr id="11" name="PlaceHolder 3"/>
+          <p:cNvPr id="14" name="PlaceHolder 3"/>
           <p:cNvSpPr>
             <a:spLocks noGrp="1"/>
           </p:cNvSpPr>
@@ -2377,7 +2938,7 @@
       </p:sp>
       <p:sp>
         <p:nvSpPr>
-          <p:cNvPr id="12" name="PlaceHolder 4"/>
+          <p:cNvPr id="15" name="PlaceHolder 4"/>
           <p:cNvSpPr>
             <a:spLocks noGrp="1"/>
           </p:cNvSpPr>
@@ -2443,7 +3004,7 @@
       </p:sp>
       <p:sp>
         <p:nvSpPr>
-          <p:cNvPr id="13" name="PlaceHolder 5"/>
+          <p:cNvPr id="16" name="PlaceHolder 5"/>
           <p:cNvSpPr>
             <a:spLocks noGrp="1"/>
           </p:cNvSpPr>
@@ -2485,7 +3046,7 @@
             <a:pPr indent="0" algn="r">
               <a:buNone/>
             </a:pPr>
-            <a:fld id="{34F0FB17-891B-4EA5-9D52-A582039189BF}" type="slidenum">
+            <a:fld id="{D5DC51D7-E9C4-4105-85B5-FEDC8E622D9D}" type="slidenum">
               <a:rPr b="0" lang="en-GB" sz="1400" strike="noStrike" u="none">
                 <a:solidFill>
                   <a:srgbClr val="ffffff"/>
@@ -2509,7 +3070,7 @@
       </p:sp>
       <p:sp>
         <p:nvSpPr>
-          <p:cNvPr id="14" name=""/>
+          <p:cNvPr id="17" name=""/>
           <p:cNvSpPr/>
           <p:nvPr/>
         </p:nvSpPr>
@@ -2562,7 +3123,7 @@
       </p:sp>
       <p:sp>
         <p:nvSpPr>
-          <p:cNvPr id="15" name=""/>
+          <p:cNvPr id="18" name=""/>
           <p:cNvSpPr/>
           <p:nvPr/>
         </p:nvSpPr>
@@ -2615,7 +3176,7 @@
       </p:sp>
       <p:sp>
         <p:nvSpPr>
-          <p:cNvPr id="16" name=""/>
+          <p:cNvPr id="19" name=""/>
           <p:cNvSpPr/>
           <p:nvPr/>
         </p:nvSpPr>
@@ -2688,7 +3249,7 @@
       </p:sp>
       <p:sp>
         <p:nvSpPr>
-          <p:cNvPr id="17" name=""/>
+          <p:cNvPr id="20" name=""/>
           <p:cNvSpPr/>
           <p:nvPr/>
         </p:nvSpPr>
@@ -2741,7 +3302,7 @@
       </p:sp>
       <p:sp>
         <p:nvSpPr>
-          <p:cNvPr id="18" name=""/>
+          <p:cNvPr id="21" name=""/>
           <p:cNvSpPr/>
           <p:nvPr/>
         </p:nvSpPr>
@@ -2817,7 +3378,7 @@
 </p:sldLayout>
 </file>
 
-<file path=ppt/slideLayouts/slideLayout5.xml><?xml version="1.0" encoding="utf-8"?>
+<file path=ppt/slideLayouts/slideLayout6.xml><?xml version="1.0" encoding="utf-8"?>
 <p:sldLayout xmlns:a="http://schemas.openxmlformats.org/drawingml/2006/main" xmlns:p="http://schemas.openxmlformats.org/presentationml/2006/main" xmlns:r="http://schemas.openxmlformats.org/officeDocument/2006/relationships" xmlns:p14="http://schemas.microsoft.com/office/powerpoint/2010/main" xmlns:p15="http://schemas.microsoft.com/office/powerpoint/2012/main" xmlns:mc="http://schemas.openxmlformats.org/markup-compatibility/2006" type="twoObj" preserve="1">
   <p:cSld name="Two columns">
     <p:bg>
@@ -2843,7 +3404,7 @@
       </p:grpSpPr>
       <p:sp>
         <p:nvSpPr>
-          <p:cNvPr id="24" name="PlaceHolder 1"/>
+          <p:cNvPr id="27" name="PlaceHolder 1"/>
           <p:cNvSpPr>
             <a:spLocks noGrp="1"/>
           </p:cNvSpPr>
@@ -2896,7 +3457,7 @@
       </p:sp>
       <p:sp>
         <p:nvSpPr>
-          <p:cNvPr id="25" name="PlaceHolder 2"/>
+          <p:cNvPr id="28" name="PlaceHolder 2"/>
           <p:cNvSpPr>
             <a:spLocks noGrp="1"/>
           </p:cNvSpPr>
@@ -3149,7 +3710,7 @@
       </p:sp>
       <p:sp>
         <p:nvSpPr>
-          <p:cNvPr id="26" name="PlaceHolder 3"/>
+          <p:cNvPr id="29" name="PlaceHolder 3"/>
           <p:cNvSpPr>
             <a:spLocks noGrp="1"/>
           </p:cNvSpPr>
@@ -3215,7 +3776,7 @@
       </p:sp>
       <p:sp>
         <p:nvSpPr>
-          <p:cNvPr id="27" name="PlaceHolder 4"/>
+          <p:cNvPr id="30" name="PlaceHolder 4"/>
           <p:cNvSpPr>
             <a:spLocks noGrp="1"/>
           </p:cNvSpPr>
@@ -3281,7 +3842,7 @@
       </p:sp>
       <p:sp>
         <p:nvSpPr>
-          <p:cNvPr id="28" name="PlaceHolder 5"/>
+          <p:cNvPr id="31" name="PlaceHolder 5"/>
           <p:cNvSpPr>
             <a:spLocks noGrp="1"/>
           </p:cNvSpPr>
@@ -3323,7 +3884,7 @@
             <a:pPr indent="0" algn="r">
               <a:buNone/>
             </a:pPr>
-            <a:fld id="{738067A3-1A24-410F-AF39-02FE1EE2E2B4}" type="slidenum">
+            <a:fld id="{397C7876-C7E6-48F8-AD16-59554C97FB1A}" type="slidenum">
               <a:rPr b="0" lang="en-GB" sz="1400" strike="noStrike" u="none">
                 <a:solidFill>
                   <a:srgbClr val="ffffff"/>
@@ -3347,7 +3908,7 @@
       </p:sp>
       <p:sp>
         <p:nvSpPr>
-          <p:cNvPr id="29" name=""/>
+          <p:cNvPr id="32" name=""/>
           <p:cNvSpPr/>
           <p:nvPr/>
         </p:nvSpPr>
@@ -3400,7 +3961,7 @@
       </p:sp>
       <p:sp>
         <p:nvSpPr>
-          <p:cNvPr id="30" name=""/>
+          <p:cNvPr id="33" name=""/>
           <p:cNvSpPr/>
           <p:nvPr/>
         </p:nvSpPr>
@@ -3453,7 +4014,7 @@
       </p:sp>
       <p:sp>
         <p:nvSpPr>
-          <p:cNvPr id="31" name=""/>
+          <p:cNvPr id="34" name=""/>
           <p:cNvSpPr/>
           <p:nvPr/>
         </p:nvSpPr>
@@ -3526,7 +4087,7 @@
       </p:sp>
       <p:sp>
         <p:nvSpPr>
-          <p:cNvPr id="32" name=""/>
+          <p:cNvPr id="35" name=""/>
           <p:cNvSpPr/>
           <p:nvPr/>
         </p:nvSpPr>
@@ -3579,7 +4140,7 @@
       </p:sp>
       <p:sp>
         <p:nvSpPr>
-          <p:cNvPr id="33" name=""/>
+          <p:cNvPr id="36" name=""/>
           <p:cNvSpPr/>
           <p:nvPr/>
         </p:nvSpPr>
@@ -3652,7 +4213,7 @@
       </p:sp>
       <p:sp>
         <p:nvSpPr>
-          <p:cNvPr id="34" name=""/>
+          <p:cNvPr id="37" name=""/>
           <p:cNvSpPr/>
           <p:nvPr/>
         </p:nvSpPr>
@@ -3705,7 +4266,7 @@
       </p:sp>
       <p:sp>
         <p:nvSpPr>
-          <p:cNvPr id="35" name=""/>
+          <p:cNvPr id="38" name=""/>
           <p:cNvSpPr/>
           <p:nvPr/>
         </p:nvSpPr>
@@ -3778,7 +4339,7 @@
       </p:sp>
       <p:sp>
         <p:nvSpPr>
-          <p:cNvPr id="36" name=""/>
+          <p:cNvPr id="39" name=""/>
           <p:cNvSpPr/>
           <p:nvPr/>
         </p:nvSpPr>
@@ -3865,7 +4426,7 @@
 </p:sldLayout>
 </file>
 
-<file path=ppt/slideLayouts/slideLayout6.xml><?xml version="1.0" encoding="utf-8"?>
+<file path=ppt/slideLayouts/slideLayout7.xml><?xml version="1.0" encoding="utf-8"?>
 <p:sldLayout xmlns:a="http://schemas.openxmlformats.org/drawingml/2006/main" xmlns:p="http://schemas.openxmlformats.org/presentationml/2006/main" xmlns:r="http://schemas.openxmlformats.org/officeDocument/2006/relationships" xmlns:p14="http://schemas.microsoft.com/office/powerpoint/2010/main" xmlns:p15="http://schemas.microsoft.com/office/powerpoint/2012/main" xmlns:mc="http://schemas.openxmlformats.org/markup-compatibility/2006" type="twoObj" preserve="1">
   <p:cSld name="One Column_">
     <p:bg>
@@ -3891,7 +4452,7 @@
       </p:grpSpPr>
       <p:sp>
         <p:nvSpPr>
-          <p:cNvPr id="47" name="PlaceHolder 1"/>
+          <p:cNvPr id="50" name="PlaceHolder 1"/>
           <p:cNvSpPr>
             <a:spLocks noGrp="1"/>
           </p:cNvSpPr>
@@ -3944,7 +4505,7 @@
       </p:sp>
       <p:sp>
         <p:nvSpPr>
-          <p:cNvPr id="48" name="PlaceHolder 2"/>
+          <p:cNvPr id="51" name="PlaceHolder 2"/>
           <p:cNvSpPr>
             <a:spLocks noGrp="1"/>
           </p:cNvSpPr>
@@ -4197,7 +4758,7 @@
       </p:sp>
       <p:sp>
         <p:nvSpPr>
-          <p:cNvPr id="49" name="PlaceHolder 3"/>
+          <p:cNvPr id="52" name="PlaceHolder 3"/>
           <p:cNvSpPr>
             <a:spLocks noGrp="1"/>
           </p:cNvSpPr>
@@ -4263,7 +4824,7 @@
       </p:sp>
       <p:sp>
         <p:nvSpPr>
-          <p:cNvPr id="50" name="PlaceHolder 4"/>
+          <p:cNvPr id="53" name="PlaceHolder 4"/>
           <p:cNvSpPr>
             <a:spLocks noGrp="1"/>
           </p:cNvSpPr>
@@ -4329,7 +4890,7 @@
       </p:sp>
       <p:sp>
         <p:nvSpPr>
-          <p:cNvPr id="51" name="PlaceHolder 5"/>
+          <p:cNvPr id="54" name="PlaceHolder 5"/>
           <p:cNvSpPr>
             <a:spLocks noGrp="1"/>
           </p:cNvSpPr>
@@ -4371,7 +4932,7 @@
             <a:pPr indent="0" algn="r">
               <a:buNone/>
             </a:pPr>
-            <a:fld id="{6834A12F-CFA0-482A-AEC8-9430F581E382}" type="slidenum">
+            <a:fld id="{28A2E9F8-C444-4CA0-A69A-24DD89F4A7B4}" type="slidenum">
               <a:rPr b="0" lang="en-GB" sz="1400" strike="noStrike" u="none">
                 <a:solidFill>
                   <a:srgbClr val="ffffff"/>
@@ -4395,7 +4956,7 @@
       </p:sp>
       <p:sp>
         <p:nvSpPr>
-          <p:cNvPr id="42" name=""/>
+          <p:cNvPr id="45" name=""/>
           <p:cNvSpPr/>
           <p:nvPr/>
         </p:nvSpPr>
@@ -4448,7 +5009,7 @@
       </p:sp>
       <p:sp>
         <p:nvSpPr>
-          <p:cNvPr id="43" name=""/>
+          <p:cNvPr id="46" name=""/>
           <p:cNvSpPr/>
           <p:nvPr/>
         </p:nvSpPr>
@@ -4501,7 +5062,7 @@
       </p:sp>
       <p:sp>
         <p:nvSpPr>
-          <p:cNvPr id="44" name=""/>
+          <p:cNvPr id="47" name=""/>
           <p:cNvSpPr/>
           <p:nvPr/>
         </p:nvSpPr>
@@ -4574,7 +5135,7 @@
       </p:sp>
       <p:sp>
         <p:nvSpPr>
-          <p:cNvPr id="45" name=""/>
+          <p:cNvPr id="48" name=""/>
           <p:cNvSpPr/>
           <p:nvPr/>
         </p:nvSpPr>
@@ -4627,7 +5188,7 @@
       </p:sp>
       <p:sp>
         <p:nvSpPr>
-          <p:cNvPr id="46" name=""/>
+          <p:cNvPr id="49" name=""/>
           <p:cNvSpPr/>
           <p:nvPr/>
         </p:nvSpPr>
@@ -4703,7 +5264,7 @@
 </p:sldLayout>
 </file>
 
-<file path=ppt/slideLayouts/slideLayout7.xml><?xml version="1.0" encoding="utf-8"?>
+<file path=ppt/slideLayouts/slideLayout8.xml><?xml version="1.0" encoding="utf-8"?>
 <p:sldLayout xmlns:a="http://schemas.openxmlformats.org/drawingml/2006/main" xmlns:p="http://schemas.openxmlformats.org/presentationml/2006/main" xmlns:r="http://schemas.openxmlformats.org/officeDocument/2006/relationships" xmlns:p14="http://schemas.microsoft.com/office/powerpoint/2010/main" xmlns:p15="http://schemas.microsoft.com/office/powerpoint/2012/main" xmlns:mc="http://schemas.openxmlformats.org/markup-compatibility/2006" type="tx" preserve="1">
   <p:cSld name="One Column_">
     <p:bg>
@@ -4729,7 +5290,7 @@
       </p:grpSpPr>
       <p:sp>
         <p:nvSpPr>
-          <p:cNvPr id="37" name="PlaceHolder 1"/>
+          <p:cNvPr id="40" name="PlaceHolder 1"/>
           <p:cNvSpPr>
             <a:spLocks noGrp="1"/>
           </p:cNvSpPr>
@@ -4782,7 +5343,7 @@
       </p:sp>
       <p:sp>
         <p:nvSpPr>
-          <p:cNvPr id="38" name="PlaceHolder 2"/>
+          <p:cNvPr id="41" name="PlaceHolder 2"/>
           <p:cNvSpPr>
             <a:spLocks noGrp="1"/>
           </p:cNvSpPr>
@@ -5035,7 +5596,7 @@
       </p:sp>
       <p:sp>
         <p:nvSpPr>
-          <p:cNvPr id="39" name="PlaceHolder 3"/>
+          <p:cNvPr id="42" name="PlaceHolder 3"/>
           <p:cNvSpPr>
             <a:spLocks noGrp="1"/>
           </p:cNvSpPr>
@@ -5101,7 +5662,7 @@
       </p:sp>
       <p:sp>
         <p:nvSpPr>
-          <p:cNvPr id="40" name="PlaceHolder 4"/>
+          <p:cNvPr id="43" name="PlaceHolder 4"/>
           <p:cNvSpPr>
             <a:spLocks noGrp="1"/>
           </p:cNvSpPr>
@@ -5167,7 +5728,7 @@
       </p:sp>
       <p:sp>
         <p:nvSpPr>
-          <p:cNvPr id="41" name="PlaceHolder 5"/>
+          <p:cNvPr id="44" name="PlaceHolder 5"/>
           <p:cNvSpPr>
             <a:spLocks noGrp="1"/>
           </p:cNvSpPr>
@@ -5209,7 +5770,7 @@
             <a:pPr indent="0" algn="r">
               <a:buNone/>
             </a:pPr>
-            <a:fld id="{C5A33B13-C28A-4480-B753-AFBCF2BA9408}" type="slidenum">
+            <a:fld id="{59287971-E5B3-49F7-953A-7FEFF61D1FDA}" type="slidenum">
               <a:rPr b="0" lang="en-GB" sz="1400" strike="noStrike" u="none">
                 <a:solidFill>
                   <a:srgbClr val="ffffff"/>
@@ -5233,7 +5794,7 @@
       </p:sp>
       <p:sp>
         <p:nvSpPr>
-          <p:cNvPr id="42" name=""/>
+          <p:cNvPr id="45" name=""/>
           <p:cNvSpPr/>
           <p:nvPr/>
         </p:nvSpPr>
@@ -5286,7 +5847,7 @@
       </p:sp>
       <p:sp>
         <p:nvSpPr>
-          <p:cNvPr id="43" name=""/>
+          <p:cNvPr id="46" name=""/>
           <p:cNvSpPr/>
           <p:nvPr/>
         </p:nvSpPr>
@@ -5339,7 +5900,7 @@
       </p:sp>
       <p:sp>
         <p:nvSpPr>
-          <p:cNvPr id="44" name=""/>
+          <p:cNvPr id="47" name=""/>
           <p:cNvSpPr/>
           <p:nvPr/>
         </p:nvSpPr>
@@ -5412,7 +5973,7 @@
       </p:sp>
       <p:sp>
         <p:nvSpPr>
-          <p:cNvPr id="45" name=""/>
+          <p:cNvPr id="48" name=""/>
           <p:cNvSpPr/>
           <p:nvPr/>
         </p:nvSpPr>
@@ -5465,7 +6026,7 @@
       </p:sp>
       <p:sp>
         <p:nvSpPr>
-          <p:cNvPr id="46" name=""/>
+          <p:cNvPr id="49" name=""/>
           <p:cNvSpPr/>
           <p:nvPr/>
         </p:nvSpPr>
@@ -5569,6 +6130,7 @@
     <p:sldLayoutId id="2147483653" r:id="rId6"/>
     <p:sldLayoutId id="2147483654" r:id="rId7"/>
     <p:sldLayoutId id="2147483655" r:id="rId8"/>
+    <p:sldLayoutId id="2147483656" r:id="rId9"/>
   </p:sldLayoutIdLst>
 </p:sldMaster>
 </file>
@@ -5592,7 +6154,7 @@
       </p:grpSpPr>
       <p:sp>
         <p:nvSpPr>
-          <p:cNvPr id="52" name="PlaceHolder 1"/>
+          <p:cNvPr id="55" name="PlaceHolder 1"/>
           <p:cNvSpPr>
             <a:spLocks noGrp="1"/>
           </p:cNvSpPr>
@@ -5675,7 +6237,7 @@
       </p:grpSpPr>
       <p:sp>
         <p:nvSpPr>
-          <p:cNvPr id="69" name="PlaceHolder 1"/>
+          <p:cNvPr id="72" name="PlaceHolder 1"/>
           <p:cNvSpPr>
             <a:spLocks noGrp="1"/>
           </p:cNvSpPr>
@@ -5704,6 +6266,17 @@
             <a:pPr indent="0">
               <a:buNone/>
             </a:pPr>
+            <a:r>
+              <a:rPr b="0" lang="en-GB" sz="4400" strike="noStrike" u="none">
+                <a:solidFill>
+                  <a:srgbClr val="ffffff"/>
+                </a:solidFill>
+                <a:effectLst/>
+                <a:uFillTx/>
+                <a:latin typeface="Arial"/>
+              </a:rPr>
+              <a:t>8.</a:t>
+            </a:r>
             <a:endParaRPr b="0" lang="en-GB" sz="4400" strike="noStrike" u="none">
               <a:solidFill>
                 <a:srgbClr val="ffffff"/>
@@ -5717,7 +6290,7 @@
       </p:sp>
       <p:sp>
         <p:nvSpPr>
-          <p:cNvPr id="70" name="PlaceHolder 2"/>
+          <p:cNvPr id="73" name="PlaceHolder 2"/>
           <p:cNvSpPr>
             <a:spLocks noGrp="1"/>
           </p:cNvSpPr>
@@ -5728,7 +6301,7 @@
         <p:spPr>
           <a:xfrm>
             <a:off x="504000" y="1326600"/>
-            <a:ext cx="4428000" cy="3288240"/>
+            <a:ext cx="9072000" cy="3288240"/>
           </a:xfrm>
           <a:prstGeom prst="rect">
             <a:avLst/>
@@ -5745,6 +6318,137 @@
           <a:p>
             <a:pPr indent="0">
               <a:spcBef>
+                <a:spcPts val="1191"/>
+              </a:spcBef>
+              <a:spcAft>
+                <a:spcPts val="992"/>
+              </a:spcAft>
+              <a:buNone/>
+            </a:pPr>
+            <a:r>
+              <a:rPr b="0" lang="en-GB" sz="3200" strike="noStrike" u="none">
+                <a:solidFill>
+                  <a:srgbClr val="ffffff"/>
+                </a:solidFill>
+                <a:effectLst/>
+                <a:uFillTx/>
+                <a:latin typeface="Arial"/>
+              </a:rPr>
+              <a:t>As an operations engineer the automation of the deployment ensures that the latest builds of the app are pushed live quickly and efficiently to the end user.</a:t>
+            </a:r>
+            <a:endParaRPr b="0" lang="en-GB" sz="3200" strike="noStrike" u="none">
+              <a:solidFill>
+                <a:srgbClr val="ffffff"/>
+              </a:solidFill>
+              <a:effectLst/>
+              <a:uFillTx/>
+              <a:latin typeface="Arial"/>
+            </a:endParaRPr>
+          </a:p>
+        </p:txBody>
+      </p:sp>
+    </p:spTree>
+  </p:cSld>
+  <mc:AlternateContent>
+    <mc:Choice Requires="p14">
+      <p:transition spd="slow" p14:dur="2000"/>
+    </mc:Choice>
+    <mc:Fallback>
+      <p:transition spd="slow"/>
+    </mc:Fallback>
+  </mc:AlternateContent>
+</p:sld>
+</file>
+
+<file path=ppt/slides/slide11.xml><?xml version="1.0" encoding="utf-8"?>
+<p:sld xmlns:a="http://schemas.openxmlformats.org/drawingml/2006/main" xmlns:p="http://schemas.openxmlformats.org/presentationml/2006/main" xmlns:r="http://schemas.openxmlformats.org/officeDocument/2006/relationships" xmlns:p14="http://schemas.microsoft.com/office/powerpoint/2010/main" xmlns:p15="http://schemas.microsoft.com/office/powerpoint/2012/main" xmlns:mc="http://schemas.openxmlformats.org/markup-compatibility/2006">
+  <p:cSld>
+    <p:spTree>
+      <p:nvGrpSpPr>
+        <p:cNvPr id="1" name=""/>
+        <p:cNvGrpSpPr/>
+        <p:nvPr/>
+      </p:nvGrpSpPr>
+      <p:grpSpPr>
+        <a:xfrm>
+          <a:off x="0" y="0"/>
+          <a:ext cx="0" cy="0"/>
+          <a:chOff x="0" y="0"/>
+          <a:chExt cx="0" cy="0"/>
+        </a:xfrm>
+      </p:grpSpPr>
+      <p:sp>
+        <p:nvSpPr>
+          <p:cNvPr id="74" name="PlaceHolder 1"/>
+          <p:cNvSpPr>
+            <a:spLocks noGrp="1"/>
+          </p:cNvSpPr>
+          <p:nvPr>
+            <p:ph type="title"/>
+          </p:nvPr>
+        </p:nvSpPr>
+        <p:spPr>
+          <a:xfrm>
+            <a:off x="144000" y="72000"/>
+            <a:ext cx="9540000" cy="648000"/>
+          </a:xfrm>
+          <a:prstGeom prst="rect">
+            <a:avLst/>
+          </a:prstGeom>
+          <a:noFill/>
+          <a:ln w="0">
+            <a:noFill/>
+          </a:ln>
+        </p:spPr>
+        <p:txBody>
+          <a:bodyPr lIns="0" rIns="0" tIns="0" bIns="0" anchor="ctr">
+            <a:spAutoFit/>
+          </a:bodyPr>
+          <a:p>
+            <a:pPr indent="0">
+              <a:buNone/>
+            </a:pPr>
+            <a:endParaRPr b="0" lang="en-GB" sz="4400" strike="noStrike" u="none">
+              <a:solidFill>
+                <a:srgbClr val="ffffff"/>
+              </a:solidFill>
+              <a:effectLst/>
+              <a:uFillTx/>
+              <a:latin typeface="Arial"/>
+            </a:endParaRPr>
+          </a:p>
+        </p:txBody>
+      </p:sp>
+      <p:sp>
+        <p:nvSpPr>
+          <p:cNvPr id="75" name="PlaceHolder 2"/>
+          <p:cNvSpPr>
+            <a:spLocks noGrp="1"/>
+          </p:cNvSpPr>
+          <p:nvPr>
+            <p:ph/>
+          </p:nvPr>
+        </p:nvSpPr>
+        <p:spPr>
+          <a:xfrm>
+            <a:off x="504000" y="1326600"/>
+            <a:ext cx="4428000" cy="3288240"/>
+          </a:xfrm>
+          <a:prstGeom prst="rect">
+            <a:avLst/>
+          </a:prstGeom>
+          <a:noFill/>
+          <a:ln w="0">
+            <a:noFill/>
+          </a:ln>
+        </p:spPr>
+        <p:txBody>
+          <a:bodyPr lIns="0" rIns="0" tIns="0" bIns="0" anchor="t">
+            <a:normAutofit/>
+          </a:bodyPr>
+          <a:p>
+            <a:pPr indent="0">
+              <a:spcBef>
                 <a:spcPts val="1417"/>
               </a:spcBef>
               <a:buNone/>
@@ -5762,7 +6466,7 @@
       </p:sp>
       <p:sp>
         <p:nvSpPr>
-          <p:cNvPr id="71" name="PlaceHolder 3"/>
+          <p:cNvPr id="76" name="PlaceHolder 3"/>
           <p:cNvSpPr>
             <a:spLocks noGrp="1"/>
           </p:cNvSpPr>
@@ -5837,7 +6541,7 @@
       </p:grpSpPr>
       <p:sp>
         <p:nvSpPr>
-          <p:cNvPr id="53" name="PlaceHolder 1"/>
+          <p:cNvPr id="56" name="PlaceHolder 1"/>
           <p:cNvSpPr>
             <a:spLocks noGrp="1"/>
           </p:cNvSpPr>
@@ -5875,7 +6579,7 @@
                 <a:uFillTx/>
                 <a:latin typeface="Arial"/>
               </a:rPr>
-              <a:t>1.</a:t>
+              <a:t>DevOps</a:t>
             </a:r>
             <a:endParaRPr b="0" lang="en-GB" sz="4400" strike="noStrike" u="none">
               <a:solidFill>
@@ -5890,7 +6594,7 @@
       </p:sp>
       <p:sp>
         <p:nvSpPr>
-          <p:cNvPr id="54" name="PlaceHolder 2"/>
+          <p:cNvPr id="57" name="PlaceHolder 2"/>
           <p:cNvSpPr>
             <a:spLocks noGrp="1"/>
           </p:cNvSpPr>
@@ -5916,12 +6620,98 @@
             <a:normAutofit/>
           </a:bodyPr>
           <a:p>
-            <a:pPr indent="0">
+            <a:pPr marL="432000" indent="-324000">
               <a:spcBef>
-                <a:spcPts val="1417"/>
+                <a:spcPts val="1191"/>
               </a:spcBef>
-              <a:buNone/>
-            </a:pPr>
+              <a:spcAft>
+                <a:spcPts val="992"/>
+              </a:spcAft>
+              <a:buClr>
+                <a:srgbClr val="ffffff"/>
+              </a:buClr>
+              <a:buFont typeface="StarSymbol"/>
+              <a:buAutoNum type="arabicParenR"/>
+            </a:pPr>
+            <a:r>
+              <a:rPr b="0" lang="en-GB" sz="3200" strike="noStrike" u="none">
+                <a:solidFill>
+                  <a:srgbClr val="ffffff"/>
+                </a:solidFill>
+                <a:effectLst/>
+                <a:uFillTx/>
+                <a:latin typeface="Arial"/>
+              </a:rPr>
+              <a:t> Introduction</a:t>
+            </a:r>
+            <a:endParaRPr b="0" lang="en-GB" sz="3200" strike="noStrike" u="none">
+              <a:solidFill>
+                <a:srgbClr val="ffffff"/>
+              </a:solidFill>
+              <a:effectLst/>
+              <a:uFillTx/>
+              <a:latin typeface="Arial"/>
+            </a:endParaRPr>
+          </a:p>
+          <a:p>
+            <a:pPr marL="432000" indent="-324000">
+              <a:spcBef>
+                <a:spcPts val="1191"/>
+              </a:spcBef>
+              <a:spcAft>
+                <a:spcPts val="992"/>
+              </a:spcAft>
+              <a:buClr>
+                <a:srgbClr val="ffffff"/>
+              </a:buClr>
+              <a:buFont typeface="StarSymbol"/>
+              <a:buAutoNum type="arabicParenR"/>
+            </a:pPr>
+            <a:r>
+              <a:rPr b="0" lang="en-GB" sz="3200" strike="noStrike" u="none">
+                <a:solidFill>
+                  <a:srgbClr val="ffffff"/>
+                </a:solidFill>
+                <a:effectLst/>
+                <a:uFillTx/>
+                <a:latin typeface="Arial"/>
+              </a:rPr>
+              <a:t> Developer Stories</a:t>
+            </a:r>
+            <a:endParaRPr b="0" lang="en-GB" sz="3200" strike="noStrike" u="none">
+              <a:solidFill>
+                <a:srgbClr val="ffffff"/>
+              </a:solidFill>
+              <a:effectLst/>
+              <a:uFillTx/>
+              <a:latin typeface="Arial"/>
+            </a:endParaRPr>
+          </a:p>
+          <a:p>
+            <a:pPr marL="432000" indent="-324000">
+              <a:spcBef>
+                <a:spcPts val="1191"/>
+              </a:spcBef>
+              <a:spcAft>
+                <a:spcPts val="992"/>
+              </a:spcAft>
+              <a:buClr>
+                <a:srgbClr val="ffffff"/>
+              </a:buClr>
+              <a:buFont typeface="StarSymbol"/>
+              <a:buAutoNum type="arabicParenR"/>
+            </a:pPr>
+            <a:r>
+              <a:rPr b="0" lang="en-GB" sz="3200" strike="noStrike" u="none">
+                <a:solidFill>
+                  <a:srgbClr val="ffffff"/>
+                </a:solidFill>
+                <a:effectLst/>
+                <a:uFillTx/>
+                <a:latin typeface="Arial"/>
+              </a:rPr>
+              <a:t> Conclusions</a:t>
+            </a:r>
             <a:endParaRPr b="0" lang="en-GB" sz="3200" strike="noStrike" u="none">
               <a:solidFill>
                 <a:srgbClr val="ffffff"/>
@@ -5965,7 +6755,7 @@
       </p:grpSpPr>
       <p:sp>
         <p:nvSpPr>
-          <p:cNvPr id="55" name="PlaceHolder 1"/>
+          <p:cNvPr id="58" name="PlaceHolder 1"/>
           <p:cNvSpPr>
             <a:spLocks noGrp="1"/>
           </p:cNvSpPr>
@@ -6003,7 +6793,7 @@
                 <a:uFillTx/>
                 <a:latin typeface="Arial"/>
               </a:rPr>
-              <a:t>2.</a:t>
+              <a:t>1.</a:t>
             </a:r>
             <a:endParaRPr b="0" lang="en-GB" sz="4400" strike="noStrike" u="none">
               <a:solidFill>
@@ -6018,7 +6808,7 @@
       </p:sp>
       <p:sp>
         <p:nvSpPr>
-          <p:cNvPr id="56" name="PlaceHolder 2"/>
+          <p:cNvPr id="59" name="PlaceHolder 2"/>
           <p:cNvSpPr>
             <a:spLocks noGrp="1"/>
           </p:cNvSpPr>
@@ -6046,10 +6836,24 @@
           <a:p>
             <a:pPr indent="0">
               <a:spcBef>
-                <a:spcPts val="1417"/>
+                <a:spcPts val="1191"/>
               </a:spcBef>
+              <a:spcAft>
+                <a:spcPts val="992"/>
+              </a:spcAft>
               <a:buNone/>
             </a:pPr>
+            <a:r>
+              <a:rPr b="0" lang="en-GB" sz="3200" strike="noStrike" u="none">
+                <a:solidFill>
+                  <a:srgbClr val="ffffff"/>
+                </a:solidFill>
+                <a:effectLst/>
+                <a:uFillTx/>
+                <a:latin typeface="Arial"/>
+              </a:rPr>
+              <a:t>As a software developer the use of git allows for version control, easier code review and collaboration.</a:t>
+            </a:r>
             <a:endParaRPr b="0" lang="en-GB" sz="3200" strike="noStrike" u="none">
               <a:solidFill>
                 <a:srgbClr val="ffffff"/>
@@ -6093,7 +6897,7 @@
       </p:grpSpPr>
       <p:sp>
         <p:nvSpPr>
-          <p:cNvPr id="57" name="PlaceHolder 1"/>
+          <p:cNvPr id="60" name="PlaceHolder 1"/>
           <p:cNvSpPr>
             <a:spLocks noGrp="1"/>
           </p:cNvSpPr>
@@ -6131,7 +6935,7 @@
                 <a:uFillTx/>
                 <a:latin typeface="Arial"/>
               </a:rPr>
-              <a:t>3.</a:t>
+              <a:t>2.</a:t>
             </a:r>
             <a:endParaRPr b="0" lang="en-GB" sz="4400" strike="noStrike" u="none">
               <a:solidFill>
@@ -6146,7 +6950,7 @@
       </p:sp>
       <p:sp>
         <p:nvSpPr>
-          <p:cNvPr id="58" name="PlaceHolder 2"/>
+          <p:cNvPr id="61" name="PlaceHolder 2"/>
           <p:cNvSpPr>
             <a:spLocks noGrp="1"/>
           </p:cNvSpPr>
@@ -6174,10 +6978,24 @@
           <a:p>
             <a:pPr indent="0">
               <a:spcBef>
-                <a:spcPts val="1417"/>
+                <a:spcPts val="1191"/>
               </a:spcBef>
+              <a:spcAft>
+                <a:spcPts val="992"/>
+              </a:spcAft>
               <a:buNone/>
             </a:pPr>
+            <a:r>
+              <a:rPr b="0" lang="en-GB" sz="3200" strike="noStrike" u="none">
+                <a:solidFill>
+                  <a:srgbClr val="ffffff"/>
+                </a:solidFill>
+                <a:effectLst/>
+                <a:uFillTx/>
+                <a:latin typeface="Arial"/>
+              </a:rPr>
+              <a:t>As a developer automation of the process is key to producing more reliable and higher quality end products.</a:t>
+            </a:r>
             <a:endParaRPr b="0" lang="en-GB" sz="3200" strike="noStrike" u="none">
               <a:solidFill>
                 <a:srgbClr val="ffffff"/>
@@ -6221,7 +7039,7 @@
       </p:grpSpPr>
       <p:sp>
         <p:nvSpPr>
-          <p:cNvPr id="59" name="PlaceHolder 1"/>
+          <p:cNvPr id="62" name="PlaceHolder 1"/>
           <p:cNvSpPr>
             <a:spLocks noGrp="1"/>
           </p:cNvSpPr>
@@ -6259,7 +7077,7 @@
                 <a:uFillTx/>
                 <a:latin typeface="Arial"/>
               </a:rPr>
-              <a:t>4.</a:t>
+              <a:t>3.</a:t>
             </a:r>
             <a:endParaRPr b="0" lang="en-GB" sz="4400" strike="noStrike" u="none">
               <a:solidFill>
@@ -6274,7 +7092,7 @@
       </p:sp>
       <p:sp>
         <p:nvSpPr>
-          <p:cNvPr id="60" name="PlaceHolder 2"/>
+          <p:cNvPr id="63" name="PlaceHolder 2"/>
           <p:cNvSpPr>
             <a:spLocks noGrp="1"/>
           </p:cNvSpPr>
@@ -6302,10 +7120,24 @@
           <a:p>
             <a:pPr indent="0">
               <a:spcBef>
-                <a:spcPts val="1417"/>
+                <a:spcPts val="1191"/>
               </a:spcBef>
+              <a:spcAft>
+                <a:spcPts val="992"/>
+              </a:spcAft>
               <a:buNone/>
             </a:pPr>
+            <a:r>
+              <a:rPr b="0" lang="en-GB" sz="3200" strike="noStrike" u="none">
+                <a:solidFill>
+                  <a:srgbClr val="ffffff"/>
+                </a:solidFill>
+                <a:effectLst/>
+                <a:uFillTx/>
+                <a:latin typeface="Arial"/>
+              </a:rPr>
+              <a:t>As a code tester the Automation of basic testing allows me to ensure that the code hits a basic level of functionality.</a:t>
+            </a:r>
             <a:endParaRPr b="0" lang="en-GB" sz="3200" strike="noStrike" u="none">
               <a:solidFill>
                 <a:srgbClr val="ffffff"/>
@@ -6349,7 +7181,7 @@
       </p:grpSpPr>
       <p:sp>
         <p:nvSpPr>
-          <p:cNvPr id="61" name="PlaceHolder 1"/>
+          <p:cNvPr id="64" name="PlaceHolder 1"/>
           <p:cNvSpPr>
             <a:spLocks noGrp="1"/>
           </p:cNvSpPr>
@@ -6387,7 +7219,7 @@
                 <a:uFillTx/>
                 <a:latin typeface="Arial"/>
               </a:rPr>
-              <a:t>5.</a:t>
+              <a:t>4.</a:t>
             </a:r>
             <a:endParaRPr b="0" lang="en-GB" sz="4400" strike="noStrike" u="none">
               <a:solidFill>
@@ -6402,7 +7234,7 @@
       </p:sp>
       <p:sp>
         <p:nvSpPr>
-          <p:cNvPr id="62" name="PlaceHolder 2"/>
+          <p:cNvPr id="65" name="PlaceHolder 2"/>
           <p:cNvSpPr>
             <a:spLocks noGrp="1"/>
           </p:cNvSpPr>
@@ -6430,10 +7262,24 @@
           <a:p>
             <a:pPr indent="0">
               <a:spcBef>
-                <a:spcPts val="1417"/>
+                <a:spcPts val="1191"/>
               </a:spcBef>
+              <a:spcAft>
+                <a:spcPts val="992"/>
+              </a:spcAft>
               <a:buNone/>
             </a:pPr>
+            <a:r>
+              <a:rPr b="0" lang="en-GB" sz="3200" strike="noStrike" u="none">
+                <a:solidFill>
+                  <a:srgbClr val="ffffff"/>
+                </a:solidFill>
+                <a:effectLst/>
+                <a:uFillTx/>
+                <a:latin typeface="Arial"/>
+              </a:rPr>
+              <a:t>As a DevOps Engineer deploying the infrastructure as code means that the deployment process is repeatable and reproducible.</a:t>
+            </a:r>
             <a:endParaRPr b="0" lang="en-GB" sz="3200" strike="noStrike" u="none">
               <a:solidFill>
                 <a:srgbClr val="ffffff"/>
@@ -6477,7 +7323,7 @@
       </p:grpSpPr>
       <p:sp>
         <p:nvSpPr>
-          <p:cNvPr id="63" name="PlaceHolder 1"/>
+          <p:cNvPr id="66" name="PlaceHolder 1"/>
           <p:cNvSpPr>
             <a:spLocks noGrp="1"/>
           </p:cNvSpPr>
@@ -6515,7 +7361,7 @@
                 <a:uFillTx/>
                 <a:latin typeface="Arial"/>
               </a:rPr>
-              <a:t>6.</a:t>
+              <a:t>5.</a:t>
             </a:r>
             <a:endParaRPr b="0" lang="en-GB" sz="4400" strike="noStrike" u="none">
               <a:solidFill>
@@ -6530,7 +7376,7 @@
       </p:sp>
       <p:sp>
         <p:nvSpPr>
-          <p:cNvPr id="64" name="PlaceHolder 2"/>
+          <p:cNvPr id="67" name="PlaceHolder 2"/>
           <p:cNvSpPr>
             <a:spLocks noGrp="1"/>
           </p:cNvSpPr>
@@ -6558,10 +7404,24 @@
           <a:p>
             <a:pPr indent="0">
               <a:spcBef>
-                <a:spcPts val="1417"/>
+                <a:spcPts val="1191"/>
               </a:spcBef>
+              <a:spcAft>
+                <a:spcPts val="992"/>
+              </a:spcAft>
               <a:buNone/>
             </a:pPr>
+            <a:r>
+              <a:rPr b="0" lang="en-GB" sz="3200" strike="noStrike" u="none">
+                <a:solidFill>
+                  <a:srgbClr val="ffffff"/>
+                </a:solidFill>
+                <a:effectLst/>
+                <a:uFillTx/>
+                <a:latin typeface="Arial"/>
+              </a:rPr>
+              <a:t>As a security developer the standardised process allows for security to be baked into the process more easily.</a:t>
+            </a:r>
             <a:endParaRPr b="0" lang="en-GB" sz="3200" strike="noStrike" u="none">
               <a:solidFill>
                 <a:srgbClr val="ffffff"/>
@@ -6605,7 +7465,7 @@
       </p:grpSpPr>
       <p:sp>
         <p:nvSpPr>
-          <p:cNvPr id="65" name="PlaceHolder 1"/>
+          <p:cNvPr id="68" name="PlaceHolder 1"/>
           <p:cNvSpPr>
             <a:spLocks noGrp="1"/>
           </p:cNvSpPr>
@@ -6643,7 +7503,7 @@
                 <a:uFillTx/>
                 <a:latin typeface="Arial"/>
               </a:rPr>
-              <a:t>7.</a:t>
+              <a:t>6.</a:t>
             </a:r>
             <a:endParaRPr b="0" lang="en-GB" sz="4400" strike="noStrike" u="none">
               <a:solidFill>
@@ -6658,7 +7518,7 @@
       </p:sp>
       <p:sp>
         <p:nvSpPr>
-          <p:cNvPr id="66" name="PlaceHolder 2"/>
+          <p:cNvPr id="69" name="PlaceHolder 2"/>
           <p:cNvSpPr>
             <a:spLocks noGrp="1"/>
           </p:cNvSpPr>
@@ -6686,10 +7546,24 @@
           <a:p>
             <a:pPr indent="0">
               <a:spcBef>
-                <a:spcPts val="1417"/>
+                <a:spcPts val="1191"/>
               </a:spcBef>
+              <a:spcAft>
+                <a:spcPts val="992"/>
+              </a:spcAft>
               <a:buNone/>
             </a:pPr>
+            <a:r>
+              <a:rPr b="0" lang="en-GB" sz="3200" strike="noStrike" u="none">
+                <a:solidFill>
+                  <a:srgbClr val="ffffff"/>
+                </a:solidFill>
+                <a:effectLst/>
+                <a:uFillTx/>
+                <a:latin typeface="Arial"/>
+              </a:rPr>
+              <a:t>As a security developer monitoring the access to the tool will help identify potential areas of weakness.</a:t>
+            </a:r>
             <a:endParaRPr b="0" lang="en-GB" sz="3200" strike="noStrike" u="none">
               <a:solidFill>
                 <a:srgbClr val="ffffff"/>
@@ -6733,7 +7607,7 @@
       </p:grpSpPr>
       <p:sp>
         <p:nvSpPr>
-          <p:cNvPr id="67" name="PlaceHolder 1"/>
+          <p:cNvPr id="70" name="PlaceHolder 1"/>
           <p:cNvSpPr>
             <a:spLocks noGrp="1"/>
           </p:cNvSpPr>
@@ -6771,7 +7645,7 @@
                 <a:uFillTx/>
                 <a:latin typeface="Arial"/>
               </a:rPr>
-              <a:t>8.</a:t>
+              <a:t>7.</a:t>
             </a:r>
             <a:endParaRPr b="0" lang="en-GB" sz="4400" strike="noStrike" u="none">
               <a:solidFill>
@@ -6786,7 +7660,7 @@
       </p:sp>
       <p:sp>
         <p:nvSpPr>
-          <p:cNvPr id="68" name="PlaceHolder 2"/>
+          <p:cNvPr id="71" name="PlaceHolder 2"/>
           <p:cNvSpPr>
             <a:spLocks noGrp="1"/>
           </p:cNvSpPr>
@@ -6814,10 +7688,24 @@
           <a:p>
             <a:pPr indent="0">
               <a:spcBef>
-                <a:spcPts val="1417"/>
+                <a:spcPts val="1191"/>
               </a:spcBef>
+              <a:spcAft>
+                <a:spcPts val="992"/>
+              </a:spcAft>
               <a:buNone/>
             </a:pPr>
+            <a:r>
+              <a:rPr b="0" lang="en-GB" sz="3200" strike="noStrike" u="none">
+                <a:solidFill>
+                  <a:srgbClr val="ffffff"/>
+                </a:solidFill>
+                <a:effectLst/>
+                <a:uFillTx/>
+                <a:latin typeface="Arial"/>
+              </a:rPr>
+              <a:t>As a data architect using the architecture monitoring tools allow for future improvements to the system.</a:t>
+            </a:r>
             <a:endParaRPr b="0" lang="en-GB" sz="3200" strike="noStrike" u="none">
               <a:solidFill>
                 <a:srgbClr val="ffffff"/>

</xml_diff>

<commit_message>
Dev stories presentation update
</commit_message>
<xml_diff>
--- a/topic-02/Developer Stories.pptx
+++ b/topic-02/Developer Stories.pptx
@@ -15,7 +15,6 @@
     <p:sldId id="263" r:id="rId10"/>
     <p:sldId id="264" r:id="rId11"/>
     <p:sldId id="265" r:id="rId12"/>
-    <p:sldId id="266" r:id="rId13"/>
   </p:sldIdLst>
   <p:sldSz cx="10080625" cy="5670550"/>
   <p:notesSz cx="7559675" cy="10691813"/>
@@ -376,7 +375,7 @@
             <a:spAutoFit/>
           </a:bodyPr>
           <a:p>
-            <a:fld id="{A3DAE913-5C55-4886-88F9-2AAB869D798D}" type="author">
+            <a:fld id="{96726747-562E-4767-8C5C-B31B3623AE81}" type="author">
               <a:rPr b="0" lang="en-GB" sz="1800" strike="noStrike" u="none">
                 <a:solidFill>
                   <a:srgbClr val="ffffff"/>
@@ -936,7 +935,7 @@
             <a:spAutoFit/>
           </a:bodyPr>
           <a:p>
-            <a:fld id="{667C313B-71B3-40EB-BBF6-21A33F741FC8}" type="author">
+            <a:fld id="{690514E5-A0DA-444C-93EB-84F2A14568C6}" type="author">
               <a:rPr b="0" lang="en-GB" sz="1800" strike="noStrike" u="none">
                 <a:solidFill>
                   <a:srgbClr val="ffffff"/>
@@ -1496,7 +1495,7 @@
             <a:spAutoFit/>
           </a:bodyPr>
           <a:p>
-            <a:fld id="{462C1674-A5C1-4242-9588-3AB07ADB87E5}" type="author">
+            <a:fld id="{71E58FBE-B68F-4275-A37A-F49C638BD503}" type="author">
               <a:rPr b="0" lang="en-GB" sz="1800" strike="noStrike" u="none">
                 <a:solidFill>
                   <a:srgbClr val="ffffff"/>
@@ -2208,7 +2207,7 @@
             <a:pPr indent="0" algn="r">
               <a:buNone/>
             </a:pPr>
-            <a:fld id="{CD2A83FB-074E-4385-93DE-1B18C9CA5867}" type="slidenum">
+            <a:fld id="{095D63B1-F76F-42F2-9309-35AB52A390D2}" type="slidenum">
               <a:rPr b="0" lang="en-GB" sz="1400" strike="noStrike" u="none">
                 <a:solidFill>
                   <a:srgbClr val="ffffff"/>
@@ -3046,7 +3045,7 @@
             <a:pPr indent="0" algn="r">
               <a:buNone/>
             </a:pPr>
-            <a:fld id="{D5DC51D7-E9C4-4105-85B5-FEDC8E622D9D}" type="slidenum">
+            <a:fld id="{A7DB23D4-884F-4517-AB03-36945195E4BA}" type="slidenum">
               <a:rPr b="0" lang="en-GB" sz="1400" strike="noStrike" u="none">
                 <a:solidFill>
                   <a:srgbClr val="ffffff"/>
@@ -3884,7 +3883,7 @@
             <a:pPr indent="0" algn="r">
               <a:buNone/>
             </a:pPr>
-            <a:fld id="{397C7876-C7E6-48F8-AD16-59554C97FB1A}" type="slidenum">
+            <a:fld id="{AE548727-199D-4AA7-9BF3-18168FDEE4EB}" type="slidenum">
               <a:rPr b="0" lang="en-GB" sz="1400" strike="noStrike" u="none">
                 <a:solidFill>
                   <a:srgbClr val="ffffff"/>
@@ -4932,7 +4931,7 @@
             <a:pPr indent="0" algn="r">
               <a:buNone/>
             </a:pPr>
-            <a:fld id="{28A2E9F8-C444-4CA0-A69A-24DD89F4A7B4}" type="slidenum">
+            <a:fld id="{184CDD6D-C13C-4C0D-9ECD-BAACEF2FECED}" type="slidenum">
               <a:rPr b="0" lang="en-GB" sz="1400" strike="noStrike" u="none">
                 <a:solidFill>
                   <a:srgbClr val="ffffff"/>
@@ -5770,7 +5769,7 @@
             <a:pPr indent="0" algn="r">
               <a:buNone/>
             </a:pPr>
-            <a:fld id="{59287971-E5B3-49F7-953A-7FEFF61D1FDA}" type="slidenum">
+            <a:fld id="{DB22EB63-9F7F-4317-8C99-FC7CB868277C}" type="slidenum">
               <a:rPr b="0" lang="en-GB" sz="1400" strike="noStrike" u="none">
                 <a:solidFill>
                   <a:srgbClr val="ffffff"/>
@@ -6275,7 +6274,7 @@
                 <a:uFillTx/>
                 <a:latin typeface="Arial"/>
               </a:rPr>
-              <a:t>8.</a:t>
+              <a:t>Conclusions</a:t>
             </a:r>
             <a:endParaRPr b="0" lang="en-GB" sz="4400" strike="noStrike" u="none">
               <a:solidFill>
@@ -6301,7 +6300,7 @@
         <p:spPr>
           <a:xfrm>
             <a:off x="504000" y="1326600"/>
-            <a:ext cx="9072000" cy="3288240"/>
+            <a:ext cx="4428000" cy="3288240"/>
           </a:xfrm>
           <a:prstGeom prst="rect">
             <a:avLst/>
@@ -6318,137 +6317,6 @@
           <a:p>
             <a:pPr indent="0">
               <a:spcBef>
-                <a:spcPts val="1191"/>
-              </a:spcBef>
-              <a:spcAft>
-                <a:spcPts val="992"/>
-              </a:spcAft>
-              <a:buNone/>
-            </a:pPr>
-            <a:r>
-              <a:rPr b="0" lang="en-GB" sz="3200" strike="noStrike" u="none">
-                <a:solidFill>
-                  <a:srgbClr val="ffffff"/>
-                </a:solidFill>
-                <a:effectLst/>
-                <a:uFillTx/>
-                <a:latin typeface="Arial"/>
-              </a:rPr>
-              <a:t>As an operations engineer the automation of the deployment ensures that the latest builds of the app are pushed live quickly and efficiently to the end user.</a:t>
-            </a:r>
-            <a:endParaRPr b="0" lang="en-GB" sz="3200" strike="noStrike" u="none">
-              <a:solidFill>
-                <a:srgbClr val="ffffff"/>
-              </a:solidFill>
-              <a:effectLst/>
-              <a:uFillTx/>
-              <a:latin typeface="Arial"/>
-            </a:endParaRPr>
-          </a:p>
-        </p:txBody>
-      </p:sp>
-    </p:spTree>
-  </p:cSld>
-  <mc:AlternateContent>
-    <mc:Choice Requires="p14">
-      <p:transition spd="slow" p14:dur="2000"/>
-    </mc:Choice>
-    <mc:Fallback>
-      <p:transition spd="slow"/>
-    </mc:Fallback>
-  </mc:AlternateContent>
-</p:sld>
-</file>
-
-<file path=ppt/slides/slide11.xml><?xml version="1.0" encoding="utf-8"?>
-<p:sld xmlns:a="http://schemas.openxmlformats.org/drawingml/2006/main" xmlns:p="http://schemas.openxmlformats.org/presentationml/2006/main" xmlns:r="http://schemas.openxmlformats.org/officeDocument/2006/relationships" xmlns:p14="http://schemas.microsoft.com/office/powerpoint/2010/main" xmlns:p15="http://schemas.microsoft.com/office/powerpoint/2012/main" xmlns:mc="http://schemas.openxmlformats.org/markup-compatibility/2006">
-  <p:cSld>
-    <p:spTree>
-      <p:nvGrpSpPr>
-        <p:cNvPr id="1" name=""/>
-        <p:cNvGrpSpPr/>
-        <p:nvPr/>
-      </p:nvGrpSpPr>
-      <p:grpSpPr>
-        <a:xfrm>
-          <a:off x="0" y="0"/>
-          <a:ext cx="0" cy="0"/>
-          <a:chOff x="0" y="0"/>
-          <a:chExt cx="0" cy="0"/>
-        </a:xfrm>
-      </p:grpSpPr>
-      <p:sp>
-        <p:nvSpPr>
-          <p:cNvPr id="74" name="PlaceHolder 1"/>
-          <p:cNvSpPr>
-            <a:spLocks noGrp="1"/>
-          </p:cNvSpPr>
-          <p:nvPr>
-            <p:ph type="title"/>
-          </p:nvPr>
-        </p:nvSpPr>
-        <p:spPr>
-          <a:xfrm>
-            <a:off x="144000" y="72000"/>
-            <a:ext cx="9540000" cy="648000"/>
-          </a:xfrm>
-          <a:prstGeom prst="rect">
-            <a:avLst/>
-          </a:prstGeom>
-          <a:noFill/>
-          <a:ln w="0">
-            <a:noFill/>
-          </a:ln>
-        </p:spPr>
-        <p:txBody>
-          <a:bodyPr lIns="0" rIns="0" tIns="0" bIns="0" anchor="ctr">
-            <a:spAutoFit/>
-          </a:bodyPr>
-          <a:p>
-            <a:pPr indent="0">
-              <a:buNone/>
-            </a:pPr>
-            <a:endParaRPr b="0" lang="en-GB" sz="4400" strike="noStrike" u="none">
-              <a:solidFill>
-                <a:srgbClr val="ffffff"/>
-              </a:solidFill>
-              <a:effectLst/>
-              <a:uFillTx/>
-              <a:latin typeface="Arial"/>
-            </a:endParaRPr>
-          </a:p>
-        </p:txBody>
-      </p:sp>
-      <p:sp>
-        <p:nvSpPr>
-          <p:cNvPr id="75" name="PlaceHolder 2"/>
-          <p:cNvSpPr>
-            <a:spLocks noGrp="1"/>
-          </p:cNvSpPr>
-          <p:nvPr>
-            <p:ph/>
-          </p:nvPr>
-        </p:nvSpPr>
-        <p:spPr>
-          <a:xfrm>
-            <a:off x="504000" y="1326600"/>
-            <a:ext cx="4428000" cy="3288240"/>
-          </a:xfrm>
-          <a:prstGeom prst="rect">
-            <a:avLst/>
-          </a:prstGeom>
-          <a:noFill/>
-          <a:ln w="0">
-            <a:noFill/>
-          </a:ln>
-        </p:spPr>
-        <p:txBody>
-          <a:bodyPr lIns="0" rIns="0" tIns="0" bIns="0" anchor="t">
-            <a:normAutofit/>
-          </a:bodyPr>
-          <a:p>
-            <a:pPr indent="0">
-              <a:spcBef>
                 <a:spcPts val="1417"/>
               </a:spcBef>
               <a:buNone/>
@@ -6466,7 +6334,7 @@
       </p:sp>
       <p:sp>
         <p:nvSpPr>
-          <p:cNvPr id="76" name="PlaceHolder 3"/>
+          <p:cNvPr id="74" name="PlaceHolder 3"/>
           <p:cNvSpPr>
             <a:spLocks noGrp="1"/>
           </p:cNvSpPr>
@@ -7562,7 +7430,7 @@
                 <a:uFillTx/>
                 <a:latin typeface="Arial"/>
               </a:rPr>
-              <a:t>As a security developer monitoring the access to the tool will help identify potential areas of weakness.</a:t>
+              <a:t>As a data architect using the architecture monitoring tools allow for future improvements to the system.</a:t>
             </a:r>
             <a:endParaRPr b="0" lang="en-GB" sz="3200" strike="noStrike" u="none">
               <a:solidFill>
@@ -7704,7 +7572,7 @@
                 <a:uFillTx/>
                 <a:latin typeface="Arial"/>
               </a:rPr>
-              <a:t>As a data architect using the architecture monitoring tools allow for future improvements to the system.</a:t>
+              <a:t>As an operations engineer the automation of the deployment ensures that the latest builds of the app are pushed live quickly and efficiently to the end user.</a:t>
             </a:r>
             <a:endParaRPr b="0" lang="en-GB" sz="3200" strike="noStrike" u="none">
               <a:solidFill>

</xml_diff>

<commit_message>
Update to dev stories presentation
</commit_message>
<xml_diff>
--- a/topic-02/Developer Stories.pptx
+++ b/topic-02/Developer Stories.pptx
@@ -15,6 +15,7 @@
     <p:sldId id="263" r:id="rId10"/>
     <p:sldId id="264" r:id="rId11"/>
     <p:sldId id="265" r:id="rId12"/>
+    <p:sldId id="266" r:id="rId13"/>
   </p:sldIdLst>
   <p:sldSz cx="10080625" cy="5670550"/>
   <p:notesSz cx="7559675" cy="10691813"/>
@@ -58,7 +59,7 @@
         <p:spPr>
           <a:xfrm>
             <a:off x="144000" y="3888000"/>
-            <a:ext cx="8999640" cy="658080"/>
+            <a:ext cx="8999280" cy="657720"/>
           </a:xfrm>
           <a:prstGeom prst="rect">
             <a:avLst/>
@@ -117,7 +118,7 @@
         <p:spPr>
           <a:xfrm>
             <a:off x="1584000" y="648000"/>
-            <a:ext cx="6479640" cy="2598480"/>
+            <a:ext cx="6479280" cy="2598120"/>
           </a:xfrm>
           <a:prstGeom prst="rect">
             <a:avLst/>
@@ -155,18 +156,7 @@
                 <a:uFillTx/>
                 <a:latin typeface="Arial"/>
               </a:rPr>
-              <a:t>Click to edit the outline </a:t>
-            </a:r>
-            <a:r>
-              <a:rPr b="0" lang="en-GB" sz="3200" strike="noStrike" u="none">
-                <a:solidFill>
-                  <a:srgbClr val="ffffff"/>
-                </a:solidFill>
-                <a:effectLst/>
-                <a:uFillTx/>
-                <a:latin typeface="Arial"/>
-              </a:rPr>
-              <a:t>text format</a:t>
+              <a:t>Click to edit the outline text format</a:t>
             </a:r>
             <a:endParaRPr b="0" lang="en-GB" sz="3200" strike="noStrike" u="none">
               <a:solidFill>
@@ -341,18 +331,7 @@
                 <a:uFillTx/>
                 <a:latin typeface="Arial"/>
               </a:rPr>
-              <a:t>Sixth Outline </a:t>
-            </a:r>
-            <a:r>
-              <a:rPr b="0" lang="en-GB" sz="2000" strike="noStrike" u="none">
-                <a:solidFill>
-                  <a:srgbClr val="ffffff"/>
-                </a:solidFill>
-                <a:effectLst/>
-                <a:uFillTx/>
-                <a:latin typeface="Arial"/>
-              </a:rPr>
-              <a:t>Level</a:t>
+              <a:t>Sixth Outline Level</a:t>
             </a:r>
             <a:endParaRPr b="0" lang="en-GB" sz="2000" strike="noStrike" u="none">
               <a:solidFill>
@@ -387,18 +366,7 @@
                 <a:uFillTx/>
                 <a:latin typeface="Arial"/>
               </a:rPr>
-              <a:t>Seventh </a:t>
-            </a:r>
-            <a:r>
-              <a:rPr b="0" lang="en-GB" sz="2000" strike="noStrike" u="none">
-                <a:solidFill>
-                  <a:srgbClr val="ffffff"/>
-                </a:solidFill>
-                <a:effectLst/>
-                <a:uFillTx/>
-                <a:latin typeface="Arial"/>
-              </a:rPr>
-              <a:t>Outline Level</a:t>
+              <a:t>Seventh Outline Level</a:t>
             </a:r>
             <a:endParaRPr b="0" lang="en-GB" sz="2000" strike="noStrike" u="none">
               <a:solidFill>
@@ -420,7 +388,7 @@
         <p:spPr>
           <a:xfrm>
             <a:off x="4104000" y="4896000"/>
-            <a:ext cx="5759640" cy="345960"/>
+            <a:ext cx="5759280" cy="345600"/>
           </a:xfrm>
           <a:prstGeom prst="rect">
             <a:avLst/>
@@ -446,7 +414,7 @@
                 <a:spcPct val="100000"/>
               </a:lnSpc>
             </a:pPr>
-            <a:fld id="{6C31E959-FEF8-4E6D-8B17-7AE37865B01B}" type="author">
+            <a:fld id="{F2FFE571-B4F7-40EC-88D3-7C525C8D13D8}" type="author">
               <a:rPr b="0" lang="en-GB" sz="1800" strike="noStrike" u="none">
                 <a:solidFill>
                   <a:srgbClr val="ffffff"/>
@@ -454,6 +422,7 @@
                 <a:effectLst/>
                 <a:uFillTx/>
                 <a:latin typeface="Arial"/>
+                <a:ea typeface="DejaVu Sans"/>
               </a:rPr>
               <a:t> </a:t>
             </a:fld>
@@ -477,7 +446,7 @@
         <p:spPr>
           <a:xfrm>
             <a:off x="25920" y="4628880"/>
-            <a:ext cx="6119640" cy="17640"/>
+            <a:ext cx="6119280" cy="17280"/>
           </a:xfrm>
           <a:prstGeom prst="roundRect">
             <a:avLst>
@@ -536,7 +505,7 @@
         <p:spPr>
           <a:xfrm>
             <a:off x="3859200" y="5324400"/>
-            <a:ext cx="6239880" cy="6840"/>
+            <a:ext cx="6239520" cy="6480"/>
           </a:xfrm>
           <a:prstGeom prst="roundRect">
             <a:avLst>
@@ -595,15 +564,15 @@
         <p:spPr>
           <a:xfrm>
             <a:off x="4044960" y="4944960"/>
-            <a:ext cx="6840" cy="487080"/>
+            <a:ext cx="6480" cy="486720"/>
           </a:xfrm>
           <a:custGeom>
             <a:avLst/>
             <a:gdLst>
-              <a:gd name="textAreaLeft" fmla="*/ 1080 w 6840"/>
-              <a:gd name="textAreaRight" fmla="*/ 6120 w 6840"/>
-              <a:gd name="textAreaTop" fmla="*/ 1080 h 487080"/>
-              <a:gd name="textAreaBottom" fmla="*/ 486360 h 487080"/>
+              <a:gd name="textAreaLeft" fmla="*/ 1080 w 6480"/>
+              <a:gd name="textAreaRight" fmla="*/ 6120 w 6480"/>
+              <a:gd name="textAreaTop" fmla="*/ 1080 h 486720"/>
+              <a:gd name="textAreaBottom" fmla="*/ 486360 h 486720"/>
             </a:gdLst>
             <a:ahLst/>
             <a:cxnLst/>
@@ -707,7 +676,7 @@
         <p:spPr>
           <a:xfrm>
             <a:off x="144000" y="3888000"/>
-            <a:ext cx="8999640" cy="658080"/>
+            <a:ext cx="8999280" cy="657720"/>
           </a:xfrm>
           <a:prstGeom prst="rect">
             <a:avLst/>
@@ -766,7 +735,7 @@
         <p:spPr>
           <a:xfrm>
             <a:off x="1584000" y="648000"/>
-            <a:ext cx="6479640" cy="2598480"/>
+            <a:ext cx="6479280" cy="2598120"/>
           </a:xfrm>
           <a:prstGeom prst="rect">
             <a:avLst/>
@@ -804,18 +773,7 @@
                 <a:uFillTx/>
                 <a:latin typeface="Arial"/>
               </a:rPr>
-              <a:t>Click to edit the outline </a:t>
-            </a:r>
-            <a:r>
-              <a:rPr b="0" lang="en-GB" sz="3200" strike="noStrike" u="none">
-                <a:solidFill>
-                  <a:srgbClr val="ffffff"/>
-                </a:solidFill>
-                <a:effectLst/>
-                <a:uFillTx/>
-                <a:latin typeface="Arial"/>
-              </a:rPr>
-              <a:t>text format</a:t>
+              <a:t>Click to edit the outline text format</a:t>
             </a:r>
             <a:endParaRPr b="0" lang="en-GB" sz="3200" strike="noStrike" u="none">
               <a:solidFill>
@@ -990,18 +948,7 @@
                 <a:uFillTx/>
                 <a:latin typeface="Arial"/>
               </a:rPr>
-              <a:t>Sixth Outline </a:t>
-            </a:r>
-            <a:r>
-              <a:rPr b="0" lang="en-GB" sz="2000" strike="noStrike" u="none">
-                <a:solidFill>
-                  <a:srgbClr val="ffffff"/>
-                </a:solidFill>
-                <a:effectLst/>
-                <a:uFillTx/>
-                <a:latin typeface="Arial"/>
-              </a:rPr>
-              <a:t>Level</a:t>
+              <a:t>Sixth Outline Level</a:t>
             </a:r>
             <a:endParaRPr b="0" lang="en-GB" sz="2000" strike="noStrike" u="none">
               <a:solidFill>
@@ -1036,18 +983,7 @@
                 <a:uFillTx/>
                 <a:latin typeface="Arial"/>
               </a:rPr>
-              <a:t>Seventh </a:t>
-            </a:r>
-            <a:r>
-              <a:rPr b="0" lang="en-GB" sz="2000" strike="noStrike" u="none">
-                <a:solidFill>
-                  <a:srgbClr val="ffffff"/>
-                </a:solidFill>
-                <a:effectLst/>
-                <a:uFillTx/>
-                <a:latin typeface="Arial"/>
-              </a:rPr>
-              <a:t>Outline Level</a:t>
+              <a:t>Seventh Outline Level</a:t>
             </a:r>
             <a:endParaRPr b="0" lang="en-GB" sz="2000" strike="noStrike" u="none">
               <a:solidFill>
@@ -1069,7 +1005,7 @@
         <p:spPr>
           <a:xfrm>
             <a:off x="4104000" y="4896000"/>
-            <a:ext cx="5759640" cy="345960"/>
+            <a:ext cx="5759280" cy="345600"/>
           </a:xfrm>
           <a:prstGeom prst="rect">
             <a:avLst/>
@@ -1095,7 +1031,7 @@
                 <a:spcPct val="100000"/>
               </a:lnSpc>
             </a:pPr>
-            <a:fld id="{DA1A5D17-44E9-4F4B-BB27-086F1176783D}" type="author">
+            <a:fld id="{570D1F82-4CC7-47FD-887F-9D9C493A98BA}" type="author">
               <a:rPr b="0" lang="en-GB" sz="1800" strike="noStrike" u="none">
                 <a:solidFill>
                   <a:srgbClr val="ffffff"/>
@@ -1103,6 +1039,7 @@
                 <a:effectLst/>
                 <a:uFillTx/>
                 <a:latin typeface="Arial"/>
+                <a:ea typeface="DejaVu Sans"/>
               </a:rPr>
               <a:t> </a:t>
             </a:fld>
@@ -1126,7 +1063,7 @@
         <p:spPr>
           <a:xfrm>
             <a:off x="25920" y="4628880"/>
-            <a:ext cx="6119640" cy="17640"/>
+            <a:ext cx="6119280" cy="17280"/>
           </a:xfrm>
           <a:prstGeom prst="roundRect">
             <a:avLst>
@@ -1185,7 +1122,7 @@
         <p:spPr>
           <a:xfrm>
             <a:off x="3859200" y="5324400"/>
-            <a:ext cx="6239880" cy="6840"/>
+            <a:ext cx="6239520" cy="6480"/>
           </a:xfrm>
           <a:prstGeom prst="roundRect">
             <a:avLst>
@@ -1244,15 +1181,15 @@
         <p:spPr>
           <a:xfrm>
             <a:off x="4044960" y="4944960"/>
-            <a:ext cx="6840" cy="487080"/>
+            <a:ext cx="6480" cy="486720"/>
           </a:xfrm>
           <a:custGeom>
             <a:avLst/>
             <a:gdLst>
-              <a:gd name="textAreaLeft" fmla="*/ 1080 w 6840"/>
-              <a:gd name="textAreaRight" fmla="*/ 6120 w 6840"/>
-              <a:gd name="textAreaTop" fmla="*/ 1080 h 487080"/>
-              <a:gd name="textAreaBottom" fmla="*/ 486360 h 487080"/>
+              <a:gd name="textAreaLeft" fmla="*/ 1080 w 6480"/>
+              <a:gd name="textAreaRight" fmla="*/ 6120 w 6480"/>
+              <a:gd name="textAreaTop" fmla="*/ 1080 h 486720"/>
+              <a:gd name="textAreaBottom" fmla="*/ 486360 h 486720"/>
             </a:gdLst>
             <a:ahLst/>
             <a:cxnLst/>
@@ -1356,7 +1293,7 @@
         <p:spPr>
           <a:xfrm>
             <a:off x="144000" y="3888000"/>
-            <a:ext cx="8999640" cy="658080"/>
+            <a:ext cx="8999280" cy="657720"/>
           </a:xfrm>
           <a:prstGeom prst="rect">
             <a:avLst/>
@@ -1415,7 +1352,7 @@
         <p:spPr>
           <a:xfrm>
             <a:off x="1584000" y="648000"/>
-            <a:ext cx="6479640" cy="2598480"/>
+            <a:ext cx="6479280" cy="2598120"/>
           </a:xfrm>
           <a:prstGeom prst="rect">
             <a:avLst/>
@@ -1685,7 +1622,7 @@
         <p:spPr>
           <a:xfrm>
             <a:off x="4104000" y="4896000"/>
-            <a:ext cx="5759640" cy="345960"/>
+            <a:ext cx="5759280" cy="345600"/>
           </a:xfrm>
           <a:prstGeom prst="rect">
             <a:avLst/>
@@ -1711,7 +1648,7 @@
                 <a:spcPct val="100000"/>
               </a:lnSpc>
             </a:pPr>
-            <a:fld id="{7842A837-94EC-4DA5-AEAD-5DB1299FAA3C}" type="author">
+            <a:fld id="{4752D72F-52B0-46E1-835C-9C603595B729}" type="author">
               <a:rPr b="0" lang="en-GB" sz="1800" strike="noStrike" u="none">
                 <a:solidFill>
                   <a:srgbClr val="ffffff"/>
@@ -1719,6 +1656,7 @@
                 <a:effectLst/>
                 <a:uFillTx/>
                 <a:latin typeface="Arial"/>
+                <a:ea typeface="DejaVu Sans"/>
               </a:rPr>
               <a:t> </a:t>
             </a:fld>
@@ -1742,7 +1680,7 @@
         <p:spPr>
           <a:xfrm>
             <a:off x="25920" y="4628880"/>
-            <a:ext cx="6119640" cy="17640"/>
+            <a:ext cx="6119280" cy="17280"/>
           </a:xfrm>
           <a:prstGeom prst="roundRect">
             <a:avLst>
@@ -1801,7 +1739,7 @@
         <p:spPr>
           <a:xfrm>
             <a:off x="3859200" y="5324400"/>
-            <a:ext cx="6239880" cy="6840"/>
+            <a:ext cx="6239520" cy="6480"/>
           </a:xfrm>
           <a:prstGeom prst="roundRect">
             <a:avLst>
@@ -1860,15 +1798,15 @@
         <p:spPr>
           <a:xfrm>
             <a:off x="4044960" y="4944960"/>
-            <a:ext cx="6840" cy="487080"/>
+            <a:ext cx="6480" cy="486720"/>
           </a:xfrm>
           <a:custGeom>
             <a:avLst/>
             <a:gdLst>
-              <a:gd name="textAreaLeft" fmla="*/ 1080 w 6840"/>
-              <a:gd name="textAreaRight" fmla="*/ 6120 w 6840"/>
-              <a:gd name="textAreaTop" fmla="*/ 1080 h 487080"/>
-              <a:gd name="textAreaBottom" fmla="*/ 486360 h 487080"/>
+              <a:gd name="textAreaLeft" fmla="*/ 1080 w 6480"/>
+              <a:gd name="textAreaRight" fmla="*/ 6120 w 6480"/>
+              <a:gd name="textAreaTop" fmla="*/ 1080 h 486720"/>
+              <a:gd name="textAreaBottom" fmla="*/ 486360 h 486720"/>
             </a:gdLst>
             <a:ahLst/>
             <a:cxnLst/>
@@ -1972,7 +1910,7 @@
         <p:spPr>
           <a:xfrm>
             <a:off x="144000" y="72000"/>
-            <a:ext cx="9539640" cy="647640"/>
+            <a:ext cx="9539280" cy="647280"/>
           </a:xfrm>
           <a:prstGeom prst="rect">
             <a:avLst/>
@@ -2031,7 +1969,7 @@
         <p:spPr>
           <a:xfrm>
             <a:off x="504000" y="1326600"/>
-            <a:ext cx="9071640" cy="3287880"/>
+            <a:ext cx="9071280" cy="3287520"/>
           </a:xfrm>
           <a:prstGeom prst="rect">
             <a:avLst/>
@@ -2305,7 +2243,7 @@
         <p:spPr>
           <a:xfrm>
             <a:off x="504000" y="5256000"/>
-            <a:ext cx="1655640" cy="213840"/>
+            <a:ext cx="1655280" cy="213840"/>
           </a:xfrm>
           <a:prstGeom prst="rect">
             <a:avLst/>
@@ -2383,7 +2321,7 @@
         <p:spPr>
           <a:xfrm>
             <a:off x="2520000" y="5256000"/>
-            <a:ext cx="4679640" cy="213840"/>
+            <a:ext cx="4679280" cy="213840"/>
           </a:xfrm>
           <a:prstGeom prst="rect">
             <a:avLst/>
@@ -2461,7 +2399,7 @@
         <p:spPr>
           <a:xfrm>
             <a:off x="7560000" y="5256000"/>
-            <a:ext cx="1619640" cy="213840"/>
+            <a:ext cx="1619280" cy="213840"/>
           </a:xfrm>
           <a:prstGeom prst="rect">
             <a:avLst/>
@@ -2504,7 +2442,7 @@
                 <a:tab algn="l" pos="0"/>
               </a:tabLst>
             </a:pPr>
-            <a:fld id="{18ABA42A-4E39-4B57-BFB2-C050033B2BA8}" type="slidenum">
+            <a:fld id="{F1237D81-614C-47A7-B3FC-060F1C2062C6}" type="slidenum">
               <a:rPr b="0" lang="en-GB" sz="1400" strike="noStrike" u="none">
                 <a:solidFill>
                   <a:srgbClr val="ffffff"/>
@@ -2535,7 +2473,7 @@
         <p:spPr>
           <a:xfrm>
             <a:off x="20880" y="607320"/>
-            <a:ext cx="6119640" cy="17640"/>
+            <a:ext cx="6119280" cy="17280"/>
           </a:xfrm>
           <a:prstGeom prst="roundRect">
             <a:avLst>
@@ -2594,7 +2532,7 @@
         <p:spPr>
           <a:xfrm>
             <a:off x="4430520" y="840960"/>
-            <a:ext cx="5673600" cy="6840"/>
+            <a:ext cx="5673240" cy="6480"/>
           </a:xfrm>
           <a:prstGeom prst="roundRect">
             <a:avLst>
@@ -2653,15 +2591,15 @@
         <p:spPr>
           <a:xfrm>
             <a:off x="9819720" y="474480"/>
-            <a:ext cx="6840" cy="492840"/>
+            <a:ext cx="6480" cy="492480"/>
           </a:xfrm>
           <a:custGeom>
             <a:avLst/>
             <a:gdLst>
-              <a:gd name="textAreaLeft" fmla="*/ 1080 w 6840"/>
-              <a:gd name="textAreaRight" fmla="*/ 6120 w 6840"/>
-              <a:gd name="textAreaTop" fmla="*/ 1080 h 492840"/>
-              <a:gd name="textAreaBottom" fmla="*/ 492120 h 492840"/>
+              <a:gd name="textAreaLeft" fmla="*/ 1080 w 6480"/>
+              <a:gd name="textAreaRight" fmla="*/ 6120 w 6480"/>
+              <a:gd name="textAreaTop" fmla="*/ 1080 h 492480"/>
+              <a:gd name="textAreaBottom" fmla="*/ 492120 h 492480"/>
             </a:gdLst>
             <a:ahLst/>
             <a:cxnLst/>
@@ -2732,7 +2670,7 @@
         <p:spPr>
           <a:xfrm>
             <a:off x="1900800" y="5204880"/>
-            <a:ext cx="7464960" cy="6840"/>
+            <a:ext cx="7464600" cy="6480"/>
           </a:xfrm>
           <a:prstGeom prst="roundRect">
             <a:avLst>
@@ -2791,15 +2729,15 @@
         <p:spPr>
           <a:xfrm>
             <a:off x="9259920" y="4917240"/>
-            <a:ext cx="6840" cy="349200"/>
+            <a:ext cx="6480" cy="348840"/>
           </a:xfrm>
           <a:custGeom>
             <a:avLst/>
             <a:gdLst>
-              <a:gd name="textAreaLeft" fmla="*/ 1080 w 6840"/>
-              <a:gd name="textAreaRight" fmla="*/ 6120 w 6840"/>
-              <a:gd name="textAreaTop" fmla="*/ 1080 h 349200"/>
-              <a:gd name="textAreaBottom" fmla="*/ 348480 h 349200"/>
+              <a:gd name="textAreaLeft" fmla="*/ 1080 w 6480"/>
+              <a:gd name="textAreaRight" fmla="*/ 6120 w 6480"/>
+              <a:gd name="textAreaTop" fmla="*/ 1080 h 348840"/>
+              <a:gd name="textAreaBottom" fmla="*/ 348480 h 348840"/>
             </a:gdLst>
             <a:ahLst/>
             <a:cxnLst/>
@@ -2903,7 +2841,7 @@
         <p:spPr>
           <a:xfrm>
             <a:off x="144000" y="72000"/>
-            <a:ext cx="9539640" cy="647640"/>
+            <a:ext cx="9539280" cy="647280"/>
           </a:xfrm>
           <a:prstGeom prst="rect">
             <a:avLst/>
@@ -2962,7 +2900,7 @@
         <p:spPr>
           <a:xfrm>
             <a:off x="504000" y="1326600"/>
-            <a:ext cx="9071640" cy="3287880"/>
+            <a:ext cx="9071280" cy="3287520"/>
           </a:xfrm>
           <a:prstGeom prst="rect">
             <a:avLst/>
@@ -3236,7 +3174,7 @@
         <p:spPr>
           <a:xfrm>
             <a:off x="504000" y="5256000"/>
-            <a:ext cx="1655640" cy="213840"/>
+            <a:ext cx="1655280" cy="213840"/>
           </a:xfrm>
           <a:prstGeom prst="rect">
             <a:avLst/>
@@ -3314,7 +3252,7 @@
         <p:spPr>
           <a:xfrm>
             <a:off x="2520000" y="5256000"/>
-            <a:ext cx="4679640" cy="213840"/>
+            <a:ext cx="4679280" cy="213840"/>
           </a:xfrm>
           <a:prstGeom prst="rect">
             <a:avLst/>
@@ -3392,7 +3330,7 @@
         <p:spPr>
           <a:xfrm>
             <a:off x="7560000" y="5256000"/>
-            <a:ext cx="1619640" cy="213840"/>
+            <a:ext cx="1619280" cy="213840"/>
           </a:xfrm>
           <a:prstGeom prst="rect">
             <a:avLst/>
@@ -3435,7 +3373,7 @@
                 <a:tab algn="l" pos="0"/>
               </a:tabLst>
             </a:pPr>
-            <a:fld id="{2CAAFCBF-488F-43BD-A028-9FEF18265FC1}" type="slidenum">
+            <a:fld id="{ED2DB1D6-4586-4AA2-B4D0-D6CA901A2D4F}" type="slidenum">
               <a:rPr b="0" lang="en-GB" sz="1400" strike="noStrike" u="none">
                 <a:solidFill>
                   <a:srgbClr val="ffffff"/>
@@ -3466,7 +3404,7 @@
         <p:spPr>
           <a:xfrm>
             <a:off x="20880" y="607320"/>
-            <a:ext cx="6119640" cy="17640"/>
+            <a:ext cx="6119280" cy="17280"/>
           </a:xfrm>
           <a:prstGeom prst="roundRect">
             <a:avLst>
@@ -3525,7 +3463,7 @@
         <p:spPr>
           <a:xfrm>
             <a:off x="4430520" y="840960"/>
-            <a:ext cx="5673600" cy="6840"/>
+            <a:ext cx="5673240" cy="6480"/>
           </a:xfrm>
           <a:prstGeom prst="roundRect">
             <a:avLst>
@@ -3584,15 +3522,15 @@
         <p:spPr>
           <a:xfrm>
             <a:off x="9819720" y="474480"/>
-            <a:ext cx="6840" cy="492840"/>
+            <a:ext cx="6480" cy="492480"/>
           </a:xfrm>
           <a:custGeom>
             <a:avLst/>
             <a:gdLst>
-              <a:gd name="textAreaLeft" fmla="*/ 1080 w 6840"/>
-              <a:gd name="textAreaRight" fmla="*/ 6120 w 6840"/>
-              <a:gd name="textAreaTop" fmla="*/ 1080 h 492840"/>
-              <a:gd name="textAreaBottom" fmla="*/ 492120 h 492840"/>
+              <a:gd name="textAreaLeft" fmla="*/ 1080 w 6480"/>
+              <a:gd name="textAreaRight" fmla="*/ 6120 w 6480"/>
+              <a:gd name="textAreaTop" fmla="*/ 1080 h 492480"/>
+              <a:gd name="textAreaBottom" fmla="*/ 492120 h 492480"/>
             </a:gdLst>
             <a:ahLst/>
             <a:cxnLst/>
@@ -3663,7 +3601,7 @@
         <p:spPr>
           <a:xfrm>
             <a:off x="1900800" y="5204880"/>
-            <a:ext cx="7464960" cy="6840"/>
+            <a:ext cx="7464600" cy="6480"/>
           </a:xfrm>
           <a:prstGeom prst="roundRect">
             <a:avLst>
@@ -3722,15 +3660,15 @@
         <p:spPr>
           <a:xfrm>
             <a:off x="9259920" y="4917240"/>
-            <a:ext cx="6840" cy="349200"/>
+            <a:ext cx="6480" cy="348840"/>
           </a:xfrm>
           <a:custGeom>
             <a:avLst/>
             <a:gdLst>
-              <a:gd name="textAreaLeft" fmla="*/ 1080 w 6840"/>
-              <a:gd name="textAreaRight" fmla="*/ 6120 w 6840"/>
-              <a:gd name="textAreaTop" fmla="*/ 1080 h 349200"/>
-              <a:gd name="textAreaBottom" fmla="*/ 348480 h 349200"/>
+              <a:gd name="textAreaLeft" fmla="*/ 1080 w 6480"/>
+              <a:gd name="textAreaRight" fmla="*/ 6120 w 6480"/>
+              <a:gd name="textAreaTop" fmla="*/ 1080 h 348840"/>
+              <a:gd name="textAreaBottom" fmla="*/ 348480 h 348840"/>
             </a:gdLst>
             <a:ahLst/>
             <a:cxnLst/>
@@ -3834,7 +3772,7 @@
         <p:spPr>
           <a:xfrm>
             <a:off x="144000" y="72000"/>
-            <a:ext cx="9539640" cy="647640"/>
+            <a:ext cx="9539280" cy="647280"/>
           </a:xfrm>
           <a:prstGeom prst="rect">
             <a:avLst/>
@@ -3893,7 +3831,7 @@
         <p:spPr>
           <a:xfrm>
             <a:off x="504000" y="1326600"/>
-            <a:ext cx="9071640" cy="3287880"/>
+            <a:ext cx="9071280" cy="3287520"/>
           </a:xfrm>
           <a:prstGeom prst="rect">
             <a:avLst/>
@@ -4167,7 +4105,7 @@
         <p:spPr>
           <a:xfrm>
             <a:off x="504000" y="5256000"/>
-            <a:ext cx="1655640" cy="213840"/>
+            <a:ext cx="1655280" cy="213840"/>
           </a:xfrm>
           <a:prstGeom prst="rect">
             <a:avLst/>
@@ -4245,7 +4183,7 @@
         <p:spPr>
           <a:xfrm>
             <a:off x="2520000" y="5256000"/>
-            <a:ext cx="4679640" cy="213840"/>
+            <a:ext cx="4679280" cy="213840"/>
           </a:xfrm>
           <a:prstGeom prst="rect">
             <a:avLst/>
@@ -4323,7 +4261,7 @@
         <p:spPr>
           <a:xfrm>
             <a:off x="7560000" y="5256000"/>
-            <a:ext cx="1619640" cy="213840"/>
+            <a:ext cx="1619280" cy="213840"/>
           </a:xfrm>
           <a:prstGeom prst="rect">
             <a:avLst/>
@@ -4366,7 +4304,7 @@
                 <a:tab algn="l" pos="0"/>
               </a:tabLst>
             </a:pPr>
-            <a:fld id="{EDA83B31-FCE3-4512-8C39-4728F5CC6F5E}" type="slidenum">
+            <a:fld id="{E057A80D-17F6-47AD-840F-69924835743A}" type="slidenum">
               <a:rPr b="0" lang="en-GB" sz="1400" strike="noStrike" u="none">
                 <a:solidFill>
                   <a:srgbClr val="ffffff"/>
@@ -4397,7 +4335,7 @@
         <p:spPr>
           <a:xfrm>
             <a:off x="20880" y="607320"/>
-            <a:ext cx="6119640" cy="17640"/>
+            <a:ext cx="6119280" cy="17280"/>
           </a:xfrm>
           <a:prstGeom prst="roundRect">
             <a:avLst>
@@ -4456,7 +4394,7 @@
         <p:spPr>
           <a:xfrm>
             <a:off x="4430520" y="840960"/>
-            <a:ext cx="5673600" cy="6840"/>
+            <a:ext cx="5673240" cy="6480"/>
           </a:xfrm>
           <a:prstGeom prst="roundRect">
             <a:avLst>
@@ -4515,15 +4453,15 @@
         <p:spPr>
           <a:xfrm>
             <a:off x="9819720" y="474480"/>
-            <a:ext cx="6840" cy="492840"/>
+            <a:ext cx="6480" cy="492480"/>
           </a:xfrm>
           <a:custGeom>
             <a:avLst/>
             <a:gdLst>
-              <a:gd name="textAreaLeft" fmla="*/ 1080 w 6840"/>
-              <a:gd name="textAreaRight" fmla="*/ 6120 w 6840"/>
-              <a:gd name="textAreaTop" fmla="*/ 1080 h 492840"/>
-              <a:gd name="textAreaBottom" fmla="*/ 492120 h 492840"/>
+              <a:gd name="textAreaLeft" fmla="*/ 1080 w 6480"/>
+              <a:gd name="textAreaRight" fmla="*/ 6120 w 6480"/>
+              <a:gd name="textAreaTop" fmla="*/ 1080 h 492480"/>
+              <a:gd name="textAreaBottom" fmla="*/ 492120 h 492480"/>
             </a:gdLst>
             <a:ahLst/>
             <a:cxnLst/>
@@ -4594,7 +4532,7 @@
         <p:spPr>
           <a:xfrm>
             <a:off x="5644080" y="5194800"/>
-            <a:ext cx="3721680" cy="6840"/>
+            <a:ext cx="3721320" cy="6480"/>
           </a:xfrm>
           <a:prstGeom prst="roundRect">
             <a:avLst>
@@ -4653,15 +4591,15 @@
         <p:spPr>
           <a:xfrm>
             <a:off x="9259920" y="4917240"/>
-            <a:ext cx="6840" cy="349200"/>
+            <a:ext cx="6480" cy="348840"/>
           </a:xfrm>
           <a:custGeom>
             <a:avLst/>
             <a:gdLst>
-              <a:gd name="textAreaLeft" fmla="*/ 1080 w 6840"/>
-              <a:gd name="textAreaRight" fmla="*/ 6120 w 6840"/>
-              <a:gd name="textAreaTop" fmla="*/ 1080 h 349200"/>
-              <a:gd name="textAreaBottom" fmla="*/ 348480 h 349200"/>
+              <a:gd name="textAreaLeft" fmla="*/ 1080 w 6480"/>
+              <a:gd name="textAreaRight" fmla="*/ 6120 w 6480"/>
+              <a:gd name="textAreaTop" fmla="*/ 1080 h 348840"/>
+              <a:gd name="textAreaBottom" fmla="*/ 348480 h 348840"/>
             </a:gdLst>
             <a:ahLst/>
             <a:cxnLst/>
@@ -4732,7 +4670,7 @@
         <p:spPr>
           <a:xfrm>
             <a:off x="974160" y="5194440"/>
-            <a:ext cx="3721680" cy="6840"/>
+            <a:ext cx="3721320" cy="6480"/>
           </a:xfrm>
           <a:prstGeom prst="roundRect">
             <a:avLst>
@@ -4791,15 +4729,15 @@
         <p:spPr>
           <a:xfrm>
             <a:off x="4590000" y="4914000"/>
-            <a:ext cx="6840" cy="349200"/>
+            <a:ext cx="6480" cy="348840"/>
           </a:xfrm>
           <a:custGeom>
             <a:avLst/>
             <a:gdLst>
-              <a:gd name="textAreaLeft" fmla="*/ 1080 w 6840"/>
-              <a:gd name="textAreaRight" fmla="*/ 6120 w 6840"/>
-              <a:gd name="textAreaTop" fmla="*/ 1080 h 349200"/>
-              <a:gd name="textAreaBottom" fmla="*/ 348480 h 349200"/>
+              <a:gd name="textAreaLeft" fmla="*/ 1080 w 6480"/>
+              <a:gd name="textAreaRight" fmla="*/ 6120 w 6480"/>
+              <a:gd name="textAreaTop" fmla="*/ 1080 h 348840"/>
+              <a:gd name="textAreaBottom" fmla="*/ 348480 h 348840"/>
             </a:gdLst>
             <a:ahLst/>
             <a:cxnLst/>
@@ -4870,15 +4808,15 @@
         <p:spPr>
           <a:xfrm>
             <a:off x="5055480" y="1037160"/>
-            <a:ext cx="10440" cy="3700440"/>
+            <a:ext cx="10080" cy="3700080"/>
           </a:xfrm>
           <a:custGeom>
             <a:avLst/>
             <a:gdLst>
-              <a:gd name="textAreaLeft" fmla="*/ 1440 w 10440"/>
-              <a:gd name="textAreaRight" fmla="*/ 9360 w 10440"/>
-              <a:gd name="textAreaTop" fmla="*/ 1440 h 3700440"/>
-              <a:gd name="textAreaBottom" fmla="*/ 3699360 h 3700440"/>
+              <a:gd name="textAreaLeft" fmla="*/ 1440 w 10080"/>
+              <a:gd name="textAreaRight" fmla="*/ 9360 w 10080"/>
+              <a:gd name="textAreaTop" fmla="*/ 1440 h 3700080"/>
+              <a:gd name="textAreaBottom" fmla="*/ 3699360 h 3700080"/>
             </a:gdLst>
             <a:ahLst/>
             <a:cxnLst/>
@@ -4993,7 +4931,7 @@
         <p:spPr>
           <a:xfrm>
             <a:off x="144000" y="72000"/>
-            <a:ext cx="9539640" cy="647640"/>
+            <a:ext cx="9539280" cy="647280"/>
           </a:xfrm>
           <a:prstGeom prst="rect">
             <a:avLst/>
@@ -5052,7 +4990,7 @@
         <p:spPr>
           <a:xfrm>
             <a:off x="504000" y="1326600"/>
-            <a:ext cx="9071640" cy="3287880"/>
+            <a:ext cx="9071280" cy="3287520"/>
           </a:xfrm>
           <a:prstGeom prst="rect">
             <a:avLst/>
@@ -5326,7 +5264,7 @@
         <p:spPr>
           <a:xfrm>
             <a:off x="504000" y="5256000"/>
-            <a:ext cx="1655640" cy="213840"/>
+            <a:ext cx="1655280" cy="213840"/>
           </a:xfrm>
           <a:prstGeom prst="rect">
             <a:avLst/>
@@ -5404,7 +5342,7 @@
         <p:spPr>
           <a:xfrm>
             <a:off x="2520000" y="5256000"/>
-            <a:ext cx="4679640" cy="213840"/>
+            <a:ext cx="4679280" cy="213840"/>
           </a:xfrm>
           <a:prstGeom prst="rect">
             <a:avLst/>
@@ -5482,7 +5420,7 @@
         <p:spPr>
           <a:xfrm>
             <a:off x="7560000" y="5256000"/>
-            <a:ext cx="1619640" cy="213840"/>
+            <a:ext cx="1619280" cy="213840"/>
           </a:xfrm>
           <a:prstGeom prst="rect">
             <a:avLst/>
@@ -5525,7 +5463,7 @@
                 <a:tab algn="l" pos="0"/>
               </a:tabLst>
             </a:pPr>
-            <a:fld id="{5435471E-2382-448C-91AD-24228A91EA72}" type="slidenum">
+            <a:fld id="{9E60BDC7-21A7-4B84-B8C6-C5B3C1ED36C1}" type="slidenum">
               <a:rPr b="0" lang="en-GB" sz="1400" strike="noStrike" u="none">
                 <a:solidFill>
                   <a:srgbClr val="ffffff"/>
@@ -5556,7 +5494,7 @@
         <p:spPr>
           <a:xfrm>
             <a:off x="20880" y="607320"/>
-            <a:ext cx="6119640" cy="17640"/>
+            <a:ext cx="6119280" cy="17280"/>
           </a:xfrm>
           <a:prstGeom prst="roundRect">
             <a:avLst>
@@ -5615,7 +5553,7 @@
         <p:spPr>
           <a:xfrm>
             <a:off x="4430520" y="840960"/>
-            <a:ext cx="5673600" cy="6840"/>
+            <a:ext cx="5673240" cy="6480"/>
           </a:xfrm>
           <a:prstGeom prst="roundRect">
             <a:avLst>
@@ -5674,15 +5612,15 @@
         <p:spPr>
           <a:xfrm>
             <a:off x="9819720" y="474480"/>
-            <a:ext cx="6840" cy="492840"/>
+            <a:ext cx="6480" cy="492480"/>
           </a:xfrm>
           <a:custGeom>
             <a:avLst/>
             <a:gdLst>
-              <a:gd name="textAreaLeft" fmla="*/ 1080 w 6840"/>
-              <a:gd name="textAreaRight" fmla="*/ 6120 w 6840"/>
-              <a:gd name="textAreaTop" fmla="*/ 1080 h 492840"/>
-              <a:gd name="textAreaBottom" fmla="*/ 492120 h 492840"/>
+              <a:gd name="textAreaLeft" fmla="*/ 1080 w 6480"/>
+              <a:gd name="textAreaRight" fmla="*/ 6120 w 6480"/>
+              <a:gd name="textAreaTop" fmla="*/ 1080 h 492480"/>
+              <a:gd name="textAreaBottom" fmla="*/ 492120 h 492480"/>
             </a:gdLst>
             <a:ahLst/>
             <a:cxnLst/>
@@ -5753,7 +5691,7 @@
         <p:spPr>
           <a:xfrm>
             <a:off x="1900800" y="5204880"/>
-            <a:ext cx="7464960" cy="6840"/>
+            <a:ext cx="7464600" cy="6480"/>
           </a:xfrm>
           <a:prstGeom prst="roundRect">
             <a:avLst>
@@ -5812,15 +5750,15 @@
         <p:spPr>
           <a:xfrm>
             <a:off x="9259920" y="4917240"/>
-            <a:ext cx="6840" cy="349200"/>
+            <a:ext cx="6480" cy="348840"/>
           </a:xfrm>
           <a:custGeom>
             <a:avLst/>
             <a:gdLst>
-              <a:gd name="textAreaLeft" fmla="*/ 1080 w 6840"/>
-              <a:gd name="textAreaRight" fmla="*/ 6120 w 6840"/>
-              <a:gd name="textAreaTop" fmla="*/ 1080 h 349200"/>
-              <a:gd name="textAreaBottom" fmla="*/ 348480 h 349200"/>
+              <a:gd name="textAreaLeft" fmla="*/ 1080 w 6480"/>
+              <a:gd name="textAreaRight" fmla="*/ 6120 w 6480"/>
+              <a:gd name="textAreaTop" fmla="*/ 1080 h 348840"/>
+              <a:gd name="textAreaBottom" fmla="*/ 348480 h 348840"/>
             </a:gdLst>
             <a:ahLst/>
             <a:cxnLst/>
@@ -5924,7 +5862,7 @@
         <p:spPr>
           <a:xfrm>
             <a:off x="144000" y="72000"/>
-            <a:ext cx="9539640" cy="647640"/>
+            <a:ext cx="9539280" cy="647280"/>
           </a:xfrm>
           <a:prstGeom prst="rect">
             <a:avLst/>
@@ -5983,7 +5921,7 @@
         <p:spPr>
           <a:xfrm>
             <a:off x="504000" y="1326600"/>
-            <a:ext cx="9071640" cy="3287880"/>
+            <a:ext cx="9071280" cy="3287520"/>
           </a:xfrm>
           <a:prstGeom prst="rect">
             <a:avLst/>
@@ -6257,7 +6195,7 @@
         <p:spPr>
           <a:xfrm>
             <a:off x="504000" y="5256000"/>
-            <a:ext cx="1655640" cy="213840"/>
+            <a:ext cx="1655280" cy="213840"/>
           </a:xfrm>
           <a:prstGeom prst="rect">
             <a:avLst/>
@@ -6335,7 +6273,7 @@
         <p:spPr>
           <a:xfrm>
             <a:off x="2520000" y="5256000"/>
-            <a:ext cx="4679640" cy="213840"/>
+            <a:ext cx="4679280" cy="213840"/>
           </a:xfrm>
           <a:prstGeom prst="rect">
             <a:avLst/>
@@ -6413,7 +6351,7 @@
         <p:spPr>
           <a:xfrm>
             <a:off x="7560000" y="5256000"/>
-            <a:ext cx="1619640" cy="213840"/>
+            <a:ext cx="1619280" cy="213840"/>
           </a:xfrm>
           <a:prstGeom prst="rect">
             <a:avLst/>
@@ -6456,7 +6394,7 @@
                 <a:tab algn="l" pos="0"/>
               </a:tabLst>
             </a:pPr>
-            <a:fld id="{3F8ADC32-CCBF-4243-A1A2-CC497416DCDA}" type="slidenum">
+            <a:fld id="{05E917C7-1AAE-49F9-8AE3-1E9BAA162C8A}" type="slidenum">
               <a:rPr b="0" lang="en-GB" sz="1400" strike="noStrike" u="none">
                 <a:solidFill>
                   <a:srgbClr val="ffffff"/>
@@ -6487,7 +6425,7 @@
         <p:spPr>
           <a:xfrm>
             <a:off x="20880" y="607320"/>
-            <a:ext cx="6119640" cy="17640"/>
+            <a:ext cx="6119280" cy="17280"/>
           </a:xfrm>
           <a:prstGeom prst="roundRect">
             <a:avLst>
@@ -6546,7 +6484,7 @@
         <p:spPr>
           <a:xfrm>
             <a:off x="4430520" y="840960"/>
-            <a:ext cx="5673600" cy="6840"/>
+            <a:ext cx="5673240" cy="6480"/>
           </a:xfrm>
           <a:prstGeom prst="roundRect">
             <a:avLst>
@@ -6605,15 +6543,15 @@
         <p:spPr>
           <a:xfrm>
             <a:off x="9819720" y="474480"/>
-            <a:ext cx="6840" cy="492840"/>
+            <a:ext cx="6480" cy="492480"/>
           </a:xfrm>
           <a:custGeom>
             <a:avLst/>
             <a:gdLst>
-              <a:gd name="textAreaLeft" fmla="*/ 1080 w 6840"/>
-              <a:gd name="textAreaRight" fmla="*/ 6120 w 6840"/>
-              <a:gd name="textAreaTop" fmla="*/ 1080 h 492840"/>
-              <a:gd name="textAreaBottom" fmla="*/ 492120 h 492840"/>
+              <a:gd name="textAreaLeft" fmla="*/ 1080 w 6480"/>
+              <a:gd name="textAreaRight" fmla="*/ 6120 w 6480"/>
+              <a:gd name="textAreaTop" fmla="*/ 1080 h 492480"/>
+              <a:gd name="textAreaBottom" fmla="*/ 492120 h 492480"/>
             </a:gdLst>
             <a:ahLst/>
             <a:cxnLst/>
@@ -6684,7 +6622,7 @@
         <p:spPr>
           <a:xfrm>
             <a:off x="1900800" y="5204880"/>
-            <a:ext cx="7464960" cy="6840"/>
+            <a:ext cx="7464600" cy="6480"/>
           </a:xfrm>
           <a:prstGeom prst="roundRect">
             <a:avLst>
@@ -6743,15 +6681,15 @@
         <p:spPr>
           <a:xfrm>
             <a:off x="9259920" y="4917240"/>
-            <a:ext cx="6840" cy="349200"/>
+            <a:ext cx="6480" cy="348840"/>
           </a:xfrm>
           <a:custGeom>
             <a:avLst/>
             <a:gdLst>
-              <a:gd name="textAreaLeft" fmla="*/ 1080 w 6840"/>
-              <a:gd name="textAreaRight" fmla="*/ 6120 w 6840"/>
-              <a:gd name="textAreaTop" fmla="*/ 1080 h 349200"/>
-              <a:gd name="textAreaBottom" fmla="*/ 348480 h 349200"/>
+              <a:gd name="textAreaLeft" fmla="*/ 1080 w 6480"/>
+              <a:gd name="textAreaRight" fmla="*/ 6120 w 6480"/>
+              <a:gd name="textAreaTop" fmla="*/ 1080 h 348840"/>
+              <a:gd name="textAreaBottom" fmla="*/ 348480 h 348840"/>
             </a:gdLst>
             <a:ahLst/>
             <a:cxnLst/>
@@ -6880,8 +6818,8 @@
         </p:nvSpPr>
         <p:spPr>
           <a:xfrm>
-            <a:off x="144000" y="3887640"/>
-            <a:ext cx="8999640" cy="658800"/>
+            <a:off x="144000" y="3887280"/>
+            <a:ext cx="8999280" cy="659160"/>
           </a:xfrm>
           <a:prstGeom prst="rect">
             <a:avLst/>
@@ -6969,8 +6907,8 @@
         </p:nvSpPr>
         <p:spPr>
           <a:xfrm>
-            <a:off x="144000" y="71640"/>
-            <a:ext cx="9539640" cy="648360"/>
+            <a:off x="144000" y="71280"/>
+            <a:ext cx="9539280" cy="648720"/>
           </a:xfrm>
           <a:prstGeom prst="rect">
             <a:avLst/>
@@ -7003,7 +6941,7 @@
                 <a:uFillTx/>
                 <a:latin typeface="Arial"/>
               </a:rPr>
-              <a:t>Conclusions</a:t>
+              <a:t>7.</a:t>
             </a:r>
             <a:endParaRPr b="0" lang="en-GB" sz="4400" strike="noStrike" u="none">
               <a:solidFill>
@@ -7029,7 +6967,7 @@
         <p:spPr>
           <a:xfrm>
             <a:off x="504000" y="1326600"/>
-            <a:ext cx="4427640" cy="3287880"/>
+            <a:ext cx="9071280" cy="3287520"/>
           </a:xfrm>
           <a:prstGeom prst="rect">
             <a:avLst/>
@@ -7045,57 +6983,32 @@
           </a:bodyPr>
           <a:p>
             <a:pPr indent="0">
+              <a:lnSpc>
+                <a:spcPct val="100000"/>
+              </a:lnSpc>
               <a:spcBef>
-                <a:spcPts val="1417"/>
+                <a:spcPts val="1191"/>
               </a:spcBef>
+              <a:spcAft>
+                <a:spcPts val="992"/>
+              </a:spcAft>
               <a:buNone/>
-            </a:pPr>
-            <a:endParaRPr b="0" lang="en-GB" sz="1800" strike="noStrike" u="none">
-              <a:solidFill>
-                <a:srgbClr val="ffffff"/>
-              </a:solidFill>
-              <a:effectLst/>
-              <a:uFillTx/>
-              <a:latin typeface="Arial"/>
-            </a:endParaRPr>
-          </a:p>
-        </p:txBody>
-      </p:sp>
-      <p:sp>
-        <p:nvSpPr>
-          <p:cNvPr id="90" name="PlaceHolder 3"/>
-          <p:cNvSpPr>
-            <a:spLocks noGrp="1"/>
-          </p:cNvSpPr>
-          <p:nvPr>
-            <p:ph/>
-          </p:nvPr>
-        </p:nvSpPr>
-        <p:spPr>
-          <a:xfrm>
-            <a:off x="5148000" y="1326600"/>
-            <a:ext cx="4427640" cy="3287880"/>
-          </a:xfrm>
-          <a:prstGeom prst="rect">
-            <a:avLst/>
-          </a:prstGeom>
-          <a:noFill/>
-          <a:ln w="0">
-            <a:noFill/>
-          </a:ln>
-        </p:spPr>
-        <p:txBody>
-          <a:bodyPr lIns="0" rIns="0" tIns="0" bIns="0" anchor="t">
-            <a:normAutofit/>
-          </a:bodyPr>
-          <a:p>
-            <a:pPr indent="0">
-              <a:spcBef>
-                <a:spcPts val="1417"/>
-              </a:spcBef>
-              <a:buNone/>
-            </a:pPr>
-            <a:endParaRPr b="0" lang="en-GB" sz="1800" strike="noStrike" u="none">
+              <a:tabLst>
+                <a:tab algn="l" pos="0"/>
+              </a:tabLst>
+            </a:pPr>
+            <a:r>
+              <a:rPr b="0" lang="en-GB" sz="3200" strike="noStrike" u="none">
+                <a:solidFill>
+                  <a:srgbClr val="ffffff"/>
+                </a:solidFill>
+                <a:effectLst/>
+                <a:uFillTx/>
+                <a:latin typeface="Arial"/>
+              </a:rPr>
+              <a:t>As an operations engineer the automation of the deployment ensures that the latest builds of the app are pushed live quickly and efficiently to the end user.</a:t>
+            </a:r>
+            <a:endParaRPr b="0" lang="en-GB" sz="3200" strike="noStrike" u="none">
               <a:solidFill>
                 <a:srgbClr val="ffffff"/>
               </a:solidFill>
@@ -7114,6 +7027,396 @@
     </mc:Choice>
     <mc:Fallback>
       <p:transition spd="slow" advTm="30000"/>
+    </mc:Fallback>
+  </mc:AlternateContent>
+</p:sld>
+</file>
+
+<file path=ppt/slides/slide11.xml><?xml version="1.0" encoding="utf-8"?>
+<p:sld xmlns:a="http://schemas.openxmlformats.org/drawingml/2006/main" xmlns:p="http://schemas.openxmlformats.org/presentationml/2006/main" xmlns:r="http://schemas.openxmlformats.org/officeDocument/2006/relationships" xmlns:p14="http://schemas.microsoft.com/office/powerpoint/2010/main" xmlns:p15="http://schemas.microsoft.com/office/powerpoint/2012/main" xmlns:mc="http://schemas.openxmlformats.org/markup-compatibility/2006">
+  <p:cSld>
+    <p:spTree>
+      <p:nvGrpSpPr>
+        <p:cNvPr id="1" name=""/>
+        <p:cNvGrpSpPr/>
+        <p:nvPr/>
+      </p:nvGrpSpPr>
+      <p:grpSpPr>
+        <a:xfrm>
+          <a:off x="0" y="0"/>
+          <a:ext cx="0" cy="0"/>
+          <a:chOff x="0" y="0"/>
+          <a:chExt cx="0" cy="0"/>
+        </a:xfrm>
+      </p:grpSpPr>
+      <p:sp>
+        <p:nvSpPr>
+          <p:cNvPr id="90" name="PlaceHolder 1"/>
+          <p:cNvSpPr>
+            <a:spLocks noGrp="1"/>
+          </p:cNvSpPr>
+          <p:nvPr>
+            <p:ph type="title"/>
+          </p:nvPr>
+        </p:nvSpPr>
+        <p:spPr>
+          <a:xfrm>
+            <a:off x="144000" y="60480"/>
+            <a:ext cx="9539280" cy="670680"/>
+          </a:xfrm>
+          <a:prstGeom prst="rect">
+            <a:avLst/>
+          </a:prstGeom>
+          <a:noFill/>
+          <a:ln w="0">
+            <a:noFill/>
+          </a:ln>
+        </p:spPr>
+        <p:txBody>
+          <a:bodyPr lIns="0" rIns="0" tIns="0" bIns="0" anchor="ctr">
+            <a:spAutoFit/>
+          </a:bodyPr>
+          <a:p>
+            <a:pPr indent="0">
+              <a:lnSpc>
+                <a:spcPct val="100000"/>
+              </a:lnSpc>
+              <a:buNone/>
+              <a:tabLst>
+                <a:tab algn="l" pos="0"/>
+              </a:tabLst>
+            </a:pPr>
+            <a:r>
+              <a:rPr b="0" lang="en-GB" sz="4400" strike="noStrike" u="none">
+                <a:solidFill>
+                  <a:srgbClr val="ffffff"/>
+                </a:solidFill>
+                <a:effectLst/>
+                <a:uFillTx/>
+                <a:latin typeface="Arial"/>
+              </a:rPr>
+              <a:t>DevOps - Conclusions</a:t>
+            </a:r>
+            <a:endParaRPr b="0" lang="en-GB" sz="4400" strike="noStrike" u="none">
+              <a:solidFill>
+                <a:srgbClr val="ffffff"/>
+              </a:solidFill>
+              <a:effectLst/>
+              <a:uFillTx/>
+              <a:latin typeface="Arial"/>
+            </a:endParaRPr>
+          </a:p>
+        </p:txBody>
+      </p:sp>
+      <p:sp>
+        <p:nvSpPr>
+          <p:cNvPr id="91" name="PlaceHolder 2"/>
+          <p:cNvSpPr>
+            <a:spLocks noGrp="1"/>
+          </p:cNvSpPr>
+          <p:nvPr>
+            <p:ph/>
+          </p:nvPr>
+        </p:nvSpPr>
+        <p:spPr>
+          <a:xfrm>
+            <a:off x="360000" y="1326600"/>
+            <a:ext cx="4427280" cy="3287520"/>
+          </a:xfrm>
+          <a:prstGeom prst="rect">
+            <a:avLst/>
+          </a:prstGeom>
+          <a:noFill/>
+          <a:ln w="0">
+            <a:noFill/>
+          </a:ln>
+        </p:spPr>
+        <p:txBody>
+          <a:bodyPr lIns="0" rIns="0" tIns="0" bIns="0" anchor="t">
+            <a:normAutofit/>
+          </a:bodyPr>
+          <a:p>
+            <a:pPr indent="0">
+              <a:spcBef>
+                <a:spcPts val="1417"/>
+              </a:spcBef>
+              <a:buNone/>
+            </a:pPr>
+            <a:r>
+              <a:rPr b="0" lang="en-GB" sz="3200" strike="noStrike" u="none">
+                <a:solidFill>
+                  <a:srgbClr val="ffffff"/>
+                </a:solidFill>
+                <a:effectLst/>
+                <a:uFillTx/>
+                <a:latin typeface="Arial"/>
+              </a:rPr>
+              <a:t>Pros:</a:t>
+            </a:r>
+            <a:endParaRPr b="0" lang="en-GB" sz="3200" strike="noStrike" u="none">
+              <a:solidFill>
+                <a:srgbClr val="ffffff"/>
+              </a:solidFill>
+              <a:effectLst/>
+              <a:uFillTx/>
+              <a:latin typeface="Arial"/>
+            </a:endParaRPr>
+          </a:p>
+          <a:p>
+            <a:pPr indent="0">
+              <a:spcBef>
+                <a:spcPts val="1417"/>
+              </a:spcBef>
+              <a:buNone/>
+            </a:pPr>
+            <a:r>
+              <a:rPr b="0" lang="en-GB" sz="3200" strike="noStrike" u="none">
+                <a:solidFill>
+                  <a:srgbClr val="ffffff"/>
+                </a:solidFill>
+                <a:effectLst/>
+                <a:uFillTx/>
+                <a:latin typeface="Arial"/>
+              </a:rPr>
+              <a:t>Increased Reliability</a:t>
+            </a:r>
+            <a:endParaRPr b="0" lang="en-GB" sz="3200" strike="noStrike" u="none">
+              <a:solidFill>
+                <a:srgbClr val="ffffff"/>
+              </a:solidFill>
+              <a:effectLst/>
+              <a:uFillTx/>
+              <a:latin typeface="Arial"/>
+            </a:endParaRPr>
+          </a:p>
+          <a:p>
+            <a:pPr indent="0">
+              <a:spcBef>
+                <a:spcPts val="1417"/>
+              </a:spcBef>
+              <a:buNone/>
+            </a:pPr>
+            <a:r>
+              <a:rPr b="0" lang="en-GB" sz="3200" strike="noStrike" u="none">
+                <a:solidFill>
+                  <a:srgbClr val="ffffff"/>
+                </a:solidFill>
+                <a:effectLst/>
+                <a:uFillTx/>
+                <a:latin typeface="Arial"/>
+              </a:rPr>
+              <a:t>Shortened deployment timeframes</a:t>
+            </a:r>
+            <a:endParaRPr b="0" lang="en-GB" sz="3200" strike="noStrike" u="none">
+              <a:solidFill>
+                <a:srgbClr val="ffffff"/>
+              </a:solidFill>
+              <a:effectLst/>
+              <a:uFillTx/>
+              <a:latin typeface="Arial"/>
+            </a:endParaRPr>
+          </a:p>
+          <a:p>
+            <a:pPr indent="0">
+              <a:spcBef>
+                <a:spcPts val="1417"/>
+              </a:spcBef>
+              <a:buNone/>
+            </a:pPr>
+            <a:r>
+              <a:rPr b="0" lang="en-GB" sz="3200" strike="noStrike" u="none">
+                <a:solidFill>
+                  <a:srgbClr val="ffffff"/>
+                </a:solidFill>
+                <a:effectLst/>
+                <a:uFillTx/>
+                <a:latin typeface="Arial"/>
+              </a:rPr>
+              <a:t>Better descision making</a:t>
+            </a:r>
+            <a:endParaRPr b="0" lang="en-GB" sz="3200" strike="noStrike" u="none">
+              <a:solidFill>
+                <a:srgbClr val="ffffff"/>
+              </a:solidFill>
+              <a:effectLst/>
+              <a:uFillTx/>
+              <a:latin typeface="Arial"/>
+            </a:endParaRPr>
+          </a:p>
+        </p:txBody>
+      </p:sp>
+      <p:sp>
+        <p:nvSpPr>
+          <p:cNvPr id="92" name="PlaceHolder 3"/>
+          <p:cNvSpPr>
+            <a:spLocks noGrp="1"/>
+          </p:cNvSpPr>
+          <p:nvPr>
+            <p:ph/>
+          </p:nvPr>
+        </p:nvSpPr>
+        <p:spPr>
+          <a:xfrm>
+            <a:off x="5400000" y="1326600"/>
+            <a:ext cx="4427280" cy="3287520"/>
+          </a:xfrm>
+          <a:prstGeom prst="rect">
+            <a:avLst/>
+          </a:prstGeom>
+          <a:noFill/>
+          <a:ln w="0">
+            <a:noFill/>
+          </a:ln>
+        </p:spPr>
+        <p:txBody>
+          <a:bodyPr lIns="0" rIns="0" tIns="0" bIns="0" anchor="t">
+            <a:normAutofit/>
+          </a:bodyPr>
+          <a:p>
+            <a:pPr indent="0">
+              <a:spcBef>
+                <a:spcPts val="1417"/>
+              </a:spcBef>
+              <a:buNone/>
+            </a:pPr>
+            <a:r>
+              <a:rPr b="0" lang="en-GB" sz="3200" strike="noStrike" u="none">
+                <a:solidFill>
+                  <a:srgbClr val="ffffff"/>
+                </a:solidFill>
+                <a:effectLst/>
+                <a:uFillTx/>
+                <a:latin typeface="Arial"/>
+              </a:rPr>
+              <a:t>Cons:</a:t>
+            </a:r>
+            <a:endParaRPr b="0" lang="en-GB" sz="3200" strike="noStrike" u="none">
+              <a:solidFill>
+                <a:srgbClr val="ffffff"/>
+              </a:solidFill>
+              <a:effectLst/>
+              <a:uFillTx/>
+              <a:latin typeface="Arial"/>
+            </a:endParaRPr>
+          </a:p>
+          <a:p>
+            <a:pPr indent="0">
+              <a:spcBef>
+                <a:spcPts val="1417"/>
+              </a:spcBef>
+              <a:buNone/>
+            </a:pPr>
+            <a:r>
+              <a:rPr b="0" lang="en-GB" sz="3200" strike="noStrike" u="none">
+                <a:solidFill>
+                  <a:srgbClr val="ffffff"/>
+                </a:solidFill>
+                <a:effectLst/>
+                <a:uFillTx/>
+                <a:latin typeface="Arial"/>
+              </a:rPr>
+              <a:t>Resistance to change</a:t>
+            </a:r>
+            <a:endParaRPr b="0" lang="en-GB" sz="3200" strike="noStrike" u="none">
+              <a:solidFill>
+                <a:srgbClr val="ffffff"/>
+              </a:solidFill>
+              <a:effectLst/>
+              <a:uFillTx/>
+              <a:latin typeface="Arial"/>
+            </a:endParaRPr>
+          </a:p>
+          <a:p>
+            <a:pPr indent="0">
+              <a:spcBef>
+                <a:spcPts val="1417"/>
+              </a:spcBef>
+              <a:buNone/>
+            </a:pPr>
+            <a:r>
+              <a:rPr b="0" lang="en-GB" sz="3200" strike="noStrike" u="none">
+                <a:solidFill>
+                  <a:srgbClr val="ffffff"/>
+                </a:solidFill>
+                <a:effectLst/>
+                <a:uFillTx/>
+                <a:latin typeface="Arial"/>
+              </a:rPr>
+              <a:t>Management support</a:t>
+            </a:r>
+            <a:endParaRPr b="0" lang="en-GB" sz="3200" strike="noStrike" u="none">
+              <a:solidFill>
+                <a:srgbClr val="ffffff"/>
+              </a:solidFill>
+              <a:effectLst/>
+              <a:uFillTx/>
+              <a:latin typeface="Arial"/>
+            </a:endParaRPr>
+          </a:p>
+          <a:p>
+            <a:pPr indent="0">
+              <a:spcBef>
+                <a:spcPts val="1417"/>
+              </a:spcBef>
+              <a:buNone/>
+            </a:pPr>
+            <a:r>
+              <a:rPr b="0" lang="en-GB" sz="3200" strike="noStrike" u="none">
+                <a:solidFill>
+                  <a:srgbClr val="ffffff"/>
+                </a:solidFill>
+                <a:effectLst/>
+                <a:uFillTx/>
+                <a:latin typeface="Arial"/>
+              </a:rPr>
+              <a:t>Regulation</a:t>
+            </a:r>
+            <a:endParaRPr b="0" lang="en-GB" sz="3200" strike="noStrike" u="none">
+              <a:solidFill>
+                <a:srgbClr val="ffffff"/>
+              </a:solidFill>
+              <a:effectLst/>
+              <a:uFillTx/>
+              <a:latin typeface="Arial"/>
+            </a:endParaRPr>
+          </a:p>
+          <a:p>
+            <a:pPr indent="0">
+              <a:spcBef>
+                <a:spcPts val="1417"/>
+              </a:spcBef>
+              <a:buNone/>
+            </a:pPr>
+            <a:r>
+              <a:rPr b="0" lang="en-GB" sz="3200" strike="noStrike" u="none">
+                <a:solidFill>
+                  <a:srgbClr val="ffffff"/>
+                </a:solidFill>
+                <a:effectLst/>
+                <a:uFillTx/>
+                <a:latin typeface="Arial"/>
+              </a:rPr>
+              <a:t>Business size</a:t>
+            </a:r>
+            <a:endParaRPr b="0" lang="en-GB" sz="3200" strike="noStrike" u="none">
+              <a:solidFill>
+                <a:srgbClr val="ffffff"/>
+              </a:solidFill>
+              <a:effectLst/>
+              <a:uFillTx/>
+              <a:latin typeface="Arial"/>
+            </a:endParaRPr>
+          </a:p>
+        </p:txBody>
+      </p:sp>
+    </p:spTree>
+  </p:cSld>
+  <mc:AlternateContent>
+    <mc:Choice Requires="p14">
+      <p:transition spd="slow" advTm="60000" p14:dur="2000"/>
+    </mc:Choice>
+    <mc:Fallback>
+      <p:transition spd="slow" advTm="60000"/>
     </mc:Fallback>
   </mc:AlternateContent>
 </p:sld>
@@ -7148,8 +7451,8 @@
         </p:nvSpPr>
         <p:spPr>
           <a:xfrm>
-            <a:off x="144000" y="71640"/>
-            <a:ext cx="9539640" cy="648360"/>
+            <a:off x="144000" y="71280"/>
+            <a:ext cx="9539280" cy="648720"/>
           </a:xfrm>
           <a:prstGeom prst="rect">
             <a:avLst/>
@@ -7208,7 +7511,7 @@
         <p:spPr>
           <a:xfrm>
             <a:off x="504000" y="1326600"/>
-            <a:ext cx="9071640" cy="3287880"/>
+            <a:ext cx="9071280" cy="3287520"/>
           </a:xfrm>
           <a:prstGeom prst="rect">
             <a:avLst/>
@@ -7377,8 +7680,8 @@
         </p:nvSpPr>
         <p:spPr>
           <a:xfrm>
-            <a:off x="144000" y="71640"/>
-            <a:ext cx="9539640" cy="648360"/>
+            <a:off x="144000" y="71280"/>
+            <a:ext cx="9539280" cy="648720"/>
           </a:xfrm>
           <a:prstGeom prst="rect">
             <a:avLst/>
@@ -7411,7 +7714,7 @@
                 <a:uFillTx/>
                 <a:latin typeface="Arial"/>
               </a:rPr>
-              <a:t>1.</a:t>
+              <a:t>DevOps</a:t>
             </a:r>
             <a:endParaRPr b="0" lang="en-GB" sz="4400" strike="noStrike" u="none">
               <a:solidFill>
@@ -7437,7 +7740,7 @@
         <p:spPr>
           <a:xfrm>
             <a:off x="504000" y="1326600"/>
-            <a:ext cx="9071640" cy="3287880"/>
+            <a:ext cx="9071280" cy="3287520"/>
           </a:xfrm>
           <a:prstGeom prst="rect">
             <a:avLst/>
@@ -7463,22 +7766,19 @@
                 <a:spcPts val="992"/>
               </a:spcAft>
               <a:buNone/>
-              <a:tabLst>
-                <a:tab algn="l" pos="0"/>
-              </a:tabLst>
-            </a:pPr>
-            <a:r>
-              <a:rPr b="0" lang="en-GB" sz="3200" strike="noStrike" u="none">
-                <a:solidFill>
-                  <a:srgbClr val="ffffff"/>
-                </a:solidFill>
-                <a:effectLst/>
-                <a:uFillTx/>
-                <a:latin typeface="Arial"/>
-              </a:rPr>
-              <a:t>As a software developer the use of git allows for version control, easier code review and collaboration.</a:t>
-            </a:r>
-            <a:endParaRPr b="0" lang="en-GB" sz="3200" strike="noStrike" u="none">
+            </a:pPr>
+            <a:r>
+              <a:rPr b="0" lang="en-GB" sz="2600" strike="noStrike" u="none">
+                <a:solidFill>
+                  <a:srgbClr val="ffffff"/>
+                </a:solidFill>
+                <a:effectLst/>
+                <a:uFillTx/>
+                <a:latin typeface="Arial"/>
+              </a:rPr>
+              <a:t>DevOps is an organisational approach to collaboration between, but not limited to, development and IT operations teams allowing for quicker and more secure system development and release (Dyck, Penners and Lichter, 2015).</a:t>
+            </a:r>
+            <a:endParaRPr b="0" lang="en-GB" sz="2600" strike="noStrike" u="none">
               <a:solidFill>
                 <a:srgbClr val="ffffff"/>
               </a:solidFill>
@@ -7493,17 +7793,17 @@
   </p:cSld>
   <mc:AlternateContent>
     <mc:Choice Requires="p14">
-      <p:transition spd="slow" advTm="30000" p14:dur="2000"/>
+      <p:transition spd="slow" advTm="60000" p14:dur="2000"/>
     </mc:Choice>
     <mc:Fallback>
-      <p:transition spd="slow" advTm="30000"/>
+      <p:transition spd="slow" advTm="60000"/>
     </mc:Fallback>
   </mc:AlternateContent>
 </p:sld>
 </file>
 
 <file path=ppt/slides/slide4.xml><?xml version="1.0" encoding="utf-8"?>
-<p:sld xmlns:a="http://schemas.openxmlformats.org/drawingml/2006/main" xmlns:p="http://schemas.openxmlformats.org/presentationml/2006/main" xmlns:r="http://schemas.openxmlformats.org/officeDocument/2006/relationships" xmlns:p14="http://schemas.microsoft.com/office/powerpoint/2010/main" xmlns:p15="http://schemas.microsoft.com/office/powerpoint/2012/main" xmlns:mc="http://schemas.openxmlformats.org/markup-compatibility/2006">
+<p:sld xmlns:a="http://schemas.openxmlformats.org/drawingml/2006/main" xmlns:p="http://schemas.openxmlformats.org/presentationml/2006/main" xmlns:r="http://schemas.openxmlformats.org/officeDocument/2006/relationships" xmlns:p14="http://schemas.microsoft.com/office/powerpoint/2010/main" xmlns:p15="http://schemas.microsoft.com/office/powerpoint/2012/main" xmlns:mc="http://schemas.openxmlformats.org/markup-compatibility/2006" show="0">
   <p:cSld>
     <p:spTree>
       <p:nvGrpSpPr>
@@ -7531,8 +7831,8 @@
         </p:nvSpPr>
         <p:spPr>
           <a:xfrm>
-            <a:off x="144000" y="71640"/>
-            <a:ext cx="9539640" cy="648360"/>
+            <a:off x="144000" y="71280"/>
+            <a:ext cx="9539280" cy="648720"/>
           </a:xfrm>
           <a:prstGeom prst="rect">
             <a:avLst/>
@@ -7565,7 +7865,7 @@
                 <a:uFillTx/>
                 <a:latin typeface="Arial"/>
               </a:rPr>
-              <a:t>2.</a:t>
+              <a:t>1.</a:t>
             </a:r>
             <a:endParaRPr b="0" lang="en-GB" sz="4400" strike="noStrike" u="none">
               <a:solidFill>
@@ -7591,7 +7891,7 @@
         <p:spPr>
           <a:xfrm>
             <a:off x="504000" y="1326600"/>
-            <a:ext cx="9071640" cy="3287880"/>
+            <a:ext cx="9071280" cy="3287520"/>
           </a:xfrm>
           <a:prstGeom prst="rect">
             <a:avLst/>
@@ -7630,7 +7930,7 @@
                 <a:uFillTx/>
                 <a:latin typeface="Arial"/>
               </a:rPr>
-              <a:t>As a developer automation of the process is key to producing more reliable and higher quality end products.</a:t>
+              <a:t>As a software developer the use of git allows for version control, easier code review and collaboration.</a:t>
             </a:r>
             <a:endParaRPr b="0" lang="en-GB" sz="3200" strike="noStrike" u="none">
               <a:solidFill>
@@ -7657,7 +7957,7 @@
 </file>
 
 <file path=ppt/slides/slide5.xml><?xml version="1.0" encoding="utf-8"?>
-<p:sld xmlns:a="http://schemas.openxmlformats.org/drawingml/2006/main" xmlns:p="http://schemas.openxmlformats.org/presentationml/2006/main" xmlns:r="http://schemas.openxmlformats.org/officeDocument/2006/relationships" xmlns:p14="http://schemas.microsoft.com/office/powerpoint/2010/main" xmlns:p15="http://schemas.microsoft.com/office/powerpoint/2012/main" xmlns:mc="http://schemas.openxmlformats.org/markup-compatibility/2006">
+<p:sld xmlns:a="http://schemas.openxmlformats.org/drawingml/2006/main" xmlns:p="http://schemas.openxmlformats.org/presentationml/2006/main" xmlns:r="http://schemas.openxmlformats.org/officeDocument/2006/relationships" xmlns:p14="http://schemas.microsoft.com/office/powerpoint/2010/main" xmlns:p15="http://schemas.microsoft.com/office/powerpoint/2012/main" xmlns:mc="http://schemas.openxmlformats.org/markup-compatibility/2006" show="0">
   <p:cSld>
     <p:spTree>
       <p:nvGrpSpPr>
@@ -7685,8 +7985,8 @@
         </p:nvSpPr>
         <p:spPr>
           <a:xfrm>
-            <a:off x="144000" y="71640"/>
-            <a:ext cx="9539640" cy="648360"/>
+            <a:off x="144000" y="71280"/>
+            <a:ext cx="9539280" cy="648720"/>
           </a:xfrm>
           <a:prstGeom prst="rect">
             <a:avLst/>
@@ -7719,7 +8019,7 @@
                 <a:uFillTx/>
                 <a:latin typeface="Arial"/>
               </a:rPr>
-              <a:t>3.</a:t>
+              <a:t>2.</a:t>
             </a:r>
             <a:endParaRPr b="0" lang="en-GB" sz="4400" strike="noStrike" u="none">
               <a:solidFill>
@@ -7745,7 +8045,7 @@
         <p:spPr>
           <a:xfrm>
             <a:off x="504000" y="1326600"/>
-            <a:ext cx="9071640" cy="3287880"/>
+            <a:ext cx="9071280" cy="3287520"/>
           </a:xfrm>
           <a:prstGeom prst="rect">
             <a:avLst/>
@@ -7784,7 +8084,51 @@
                 <a:uFillTx/>
                 <a:latin typeface="Arial"/>
               </a:rPr>
-              <a:t>As a code tester the Automation of basic testing allows me to ensure that the code hits a basic level of functionality.</a:t>
+              <a:t>As a developer </a:t>
+            </a:r>
+            <a:r>
+              <a:rPr b="0" lang="en-GB" sz="3200" strike="noStrike" u="none">
+                <a:solidFill>
+                  <a:srgbClr val="ffffff"/>
+                </a:solidFill>
+                <a:effectLst/>
+                <a:uFillTx/>
+                <a:latin typeface="Arial"/>
+              </a:rPr>
+              <a:t>automation of the process </a:t>
+            </a:r>
+            <a:r>
+              <a:rPr b="0" lang="en-GB" sz="3200" strike="noStrike" u="none">
+                <a:solidFill>
+                  <a:srgbClr val="ffffff"/>
+                </a:solidFill>
+                <a:effectLst/>
+                <a:uFillTx/>
+                <a:latin typeface="Arial"/>
+              </a:rPr>
+              <a:t>is key to producing more </a:t>
+            </a:r>
+            <a:r>
+              <a:rPr b="0" lang="en-GB" sz="3200" strike="noStrike" u="none">
+                <a:solidFill>
+                  <a:srgbClr val="ffffff"/>
+                </a:solidFill>
+                <a:effectLst/>
+                <a:uFillTx/>
+                <a:latin typeface="Arial"/>
+              </a:rPr>
+              <a:t>reliable and higher quality </a:t>
+            </a:r>
+            <a:r>
+              <a:rPr b="0" lang="en-GB" sz="3200" strike="noStrike" u="none">
+                <a:solidFill>
+                  <a:srgbClr val="ffffff"/>
+                </a:solidFill>
+                <a:effectLst/>
+                <a:uFillTx/>
+                <a:latin typeface="Arial"/>
+              </a:rPr>
+              <a:t>end products.</a:t>
             </a:r>
             <a:endParaRPr b="0" lang="en-GB" sz="3200" strike="noStrike" u="none">
               <a:solidFill>
@@ -7811,7 +8155,7 @@
 </file>
 
 <file path=ppt/slides/slide6.xml><?xml version="1.0" encoding="utf-8"?>
-<p:sld xmlns:a="http://schemas.openxmlformats.org/drawingml/2006/main" xmlns:p="http://schemas.openxmlformats.org/presentationml/2006/main" xmlns:r="http://schemas.openxmlformats.org/officeDocument/2006/relationships" xmlns:p14="http://schemas.microsoft.com/office/powerpoint/2010/main" xmlns:p15="http://schemas.microsoft.com/office/powerpoint/2012/main" xmlns:mc="http://schemas.openxmlformats.org/markup-compatibility/2006">
+<p:sld xmlns:a="http://schemas.openxmlformats.org/drawingml/2006/main" xmlns:p="http://schemas.openxmlformats.org/presentationml/2006/main" xmlns:r="http://schemas.openxmlformats.org/officeDocument/2006/relationships" xmlns:p14="http://schemas.microsoft.com/office/powerpoint/2010/main" xmlns:p15="http://schemas.microsoft.com/office/powerpoint/2012/main" xmlns:mc="http://schemas.openxmlformats.org/markup-compatibility/2006" show="0">
   <p:cSld>
     <p:spTree>
       <p:nvGrpSpPr>
@@ -7839,8 +8183,8 @@
         </p:nvSpPr>
         <p:spPr>
           <a:xfrm>
-            <a:off x="144000" y="71640"/>
-            <a:ext cx="9539640" cy="648360"/>
+            <a:off x="144000" y="71280"/>
+            <a:ext cx="9539280" cy="648720"/>
           </a:xfrm>
           <a:prstGeom prst="rect">
             <a:avLst/>
@@ -7873,7 +8217,7 @@
                 <a:uFillTx/>
                 <a:latin typeface="Arial"/>
               </a:rPr>
-              <a:t>4.</a:t>
+              <a:t>3.</a:t>
             </a:r>
             <a:endParaRPr b="0" lang="en-GB" sz="4400" strike="noStrike" u="none">
               <a:solidFill>
@@ -7899,7 +8243,7 @@
         <p:spPr>
           <a:xfrm>
             <a:off x="504000" y="1326600"/>
-            <a:ext cx="9071640" cy="3287880"/>
+            <a:ext cx="9071280" cy="3287520"/>
           </a:xfrm>
           <a:prstGeom prst="rect">
             <a:avLst/>
@@ -7938,7 +8282,7 @@
                 <a:uFillTx/>
                 <a:latin typeface="Arial"/>
               </a:rPr>
-              <a:t>As a DevOps Engineer deploying the infrastructure as code means that the deployment process is repeatable and reproducible.</a:t>
+              <a:t>As a code tester the Automation of basic testing allows me to ensure that the code hits a basic level of functionality.</a:t>
             </a:r>
             <a:endParaRPr b="0" lang="en-GB" sz="3200" strike="noStrike" u="none">
               <a:solidFill>
@@ -7965,7 +8309,7 @@
 </file>
 
 <file path=ppt/slides/slide7.xml><?xml version="1.0" encoding="utf-8"?>
-<p:sld xmlns:a="http://schemas.openxmlformats.org/drawingml/2006/main" xmlns:p="http://schemas.openxmlformats.org/presentationml/2006/main" xmlns:r="http://schemas.openxmlformats.org/officeDocument/2006/relationships" xmlns:p14="http://schemas.microsoft.com/office/powerpoint/2010/main" xmlns:p15="http://schemas.microsoft.com/office/powerpoint/2012/main" xmlns:mc="http://schemas.openxmlformats.org/markup-compatibility/2006">
+<p:sld xmlns:a="http://schemas.openxmlformats.org/drawingml/2006/main" xmlns:p="http://schemas.openxmlformats.org/presentationml/2006/main" xmlns:r="http://schemas.openxmlformats.org/officeDocument/2006/relationships" xmlns:p14="http://schemas.microsoft.com/office/powerpoint/2010/main" xmlns:p15="http://schemas.microsoft.com/office/powerpoint/2012/main" xmlns:mc="http://schemas.openxmlformats.org/markup-compatibility/2006" show="0">
   <p:cSld>
     <p:spTree>
       <p:nvGrpSpPr>
@@ -7993,8 +8337,8 @@
         </p:nvSpPr>
         <p:spPr>
           <a:xfrm>
-            <a:off x="144000" y="71640"/>
-            <a:ext cx="9539640" cy="648360"/>
+            <a:off x="144000" y="71280"/>
+            <a:ext cx="9539280" cy="648720"/>
           </a:xfrm>
           <a:prstGeom prst="rect">
             <a:avLst/>
@@ -8027,7 +8371,7 @@
                 <a:uFillTx/>
                 <a:latin typeface="Arial"/>
               </a:rPr>
-              <a:t>5.</a:t>
+              <a:t>4.</a:t>
             </a:r>
             <a:endParaRPr b="0" lang="en-GB" sz="4400" strike="noStrike" u="none">
               <a:solidFill>
@@ -8053,7 +8397,7 @@
         <p:spPr>
           <a:xfrm>
             <a:off x="504000" y="1326600"/>
-            <a:ext cx="9071640" cy="3287880"/>
+            <a:ext cx="9071280" cy="3287520"/>
           </a:xfrm>
           <a:prstGeom prst="rect">
             <a:avLst/>
@@ -8092,7 +8436,73 @@
                 <a:uFillTx/>
                 <a:latin typeface="Arial"/>
               </a:rPr>
-              <a:t>As a security developer the standardised process allows for security to be baked into the process more easily.</a:t>
+              <a:t>As a DevOps Engineer </a:t>
+            </a:r>
+            <a:r>
+              <a:rPr b="0" lang="en-GB" sz="3200" strike="noStrike" u="none">
+                <a:solidFill>
+                  <a:srgbClr val="ffffff"/>
+                </a:solidFill>
+                <a:effectLst/>
+                <a:uFillTx/>
+                <a:latin typeface="Arial"/>
+              </a:rPr>
+              <a:t>deploying the </a:t>
+            </a:r>
+            <a:r>
+              <a:rPr b="0" lang="en-GB" sz="3200" strike="noStrike" u="none">
+                <a:solidFill>
+                  <a:srgbClr val="ffffff"/>
+                </a:solidFill>
+                <a:effectLst/>
+                <a:uFillTx/>
+                <a:latin typeface="Arial"/>
+              </a:rPr>
+              <a:t>infrastructure as code </a:t>
+            </a:r>
+            <a:r>
+              <a:rPr b="0" lang="en-GB" sz="3200" strike="noStrike" u="none">
+                <a:solidFill>
+                  <a:srgbClr val="ffffff"/>
+                </a:solidFill>
+                <a:effectLst/>
+                <a:uFillTx/>
+                <a:latin typeface="Arial"/>
+              </a:rPr>
+              <a:t>means that the </a:t>
+            </a:r>
+            <a:r>
+              <a:rPr b="0" lang="en-GB" sz="3200" strike="noStrike" u="none">
+                <a:solidFill>
+                  <a:srgbClr val="ffffff"/>
+                </a:solidFill>
+                <a:effectLst/>
+                <a:uFillTx/>
+                <a:latin typeface="Arial"/>
+              </a:rPr>
+              <a:t>deployment process is </a:t>
+            </a:r>
+            <a:r>
+              <a:rPr b="0" lang="en-GB" sz="3200" strike="noStrike" u="none">
+                <a:solidFill>
+                  <a:srgbClr val="ffffff"/>
+                </a:solidFill>
+                <a:effectLst/>
+                <a:uFillTx/>
+                <a:latin typeface="Arial"/>
+              </a:rPr>
+              <a:t>repeatable and </a:t>
+            </a:r>
+            <a:r>
+              <a:rPr b="0" lang="en-GB" sz="3200" strike="noStrike" u="none">
+                <a:solidFill>
+                  <a:srgbClr val="ffffff"/>
+                </a:solidFill>
+                <a:effectLst/>
+                <a:uFillTx/>
+                <a:latin typeface="Arial"/>
+              </a:rPr>
+              <a:t>reproducible.</a:t>
             </a:r>
             <a:endParaRPr b="0" lang="en-GB" sz="3200" strike="noStrike" u="none">
               <a:solidFill>
@@ -8119,7 +8529,7 @@
 </file>
 
 <file path=ppt/slides/slide8.xml><?xml version="1.0" encoding="utf-8"?>
-<p:sld xmlns:a="http://schemas.openxmlformats.org/drawingml/2006/main" xmlns:p="http://schemas.openxmlformats.org/presentationml/2006/main" xmlns:r="http://schemas.openxmlformats.org/officeDocument/2006/relationships" xmlns:p14="http://schemas.microsoft.com/office/powerpoint/2010/main" xmlns:p15="http://schemas.microsoft.com/office/powerpoint/2012/main" xmlns:mc="http://schemas.openxmlformats.org/markup-compatibility/2006">
+<p:sld xmlns:a="http://schemas.openxmlformats.org/drawingml/2006/main" xmlns:p="http://schemas.openxmlformats.org/presentationml/2006/main" xmlns:r="http://schemas.openxmlformats.org/officeDocument/2006/relationships" xmlns:p14="http://schemas.microsoft.com/office/powerpoint/2010/main" xmlns:p15="http://schemas.microsoft.com/office/powerpoint/2012/main" xmlns:mc="http://schemas.openxmlformats.org/markup-compatibility/2006" show="0">
   <p:cSld>
     <p:spTree>
       <p:nvGrpSpPr>
@@ -8147,8 +8557,8 @@
         </p:nvSpPr>
         <p:spPr>
           <a:xfrm>
-            <a:off x="144000" y="71640"/>
-            <a:ext cx="9539640" cy="648360"/>
+            <a:off x="144000" y="71280"/>
+            <a:ext cx="9539280" cy="648720"/>
           </a:xfrm>
           <a:prstGeom prst="rect">
             <a:avLst/>
@@ -8181,7 +8591,7 @@
                 <a:uFillTx/>
                 <a:latin typeface="Arial"/>
               </a:rPr>
-              <a:t>6.</a:t>
+              <a:t>5.</a:t>
             </a:r>
             <a:endParaRPr b="0" lang="en-GB" sz="4400" strike="noStrike" u="none">
               <a:solidFill>
@@ -8207,7 +8617,7 @@
         <p:spPr>
           <a:xfrm>
             <a:off x="504000" y="1326600"/>
-            <a:ext cx="9071640" cy="3287880"/>
+            <a:ext cx="9071280" cy="3287520"/>
           </a:xfrm>
           <a:prstGeom prst="rect">
             <a:avLst/>
@@ -8246,7 +8656,7 @@
                 <a:uFillTx/>
                 <a:latin typeface="Arial"/>
               </a:rPr>
-              <a:t>As a data architect using the architecture monitoring tools allow for future improvements to the system.</a:t>
+              <a:t>As a security developer the standardised process allows for security to be baked into the process more easily.</a:t>
             </a:r>
             <a:endParaRPr b="0" lang="en-GB" sz="3200" strike="noStrike" u="none">
               <a:solidFill>
@@ -8273,7 +8683,7 @@
 </file>
 
 <file path=ppt/slides/slide9.xml><?xml version="1.0" encoding="utf-8"?>
-<p:sld xmlns:a="http://schemas.openxmlformats.org/drawingml/2006/main" xmlns:p="http://schemas.openxmlformats.org/presentationml/2006/main" xmlns:r="http://schemas.openxmlformats.org/officeDocument/2006/relationships" xmlns:p14="http://schemas.microsoft.com/office/powerpoint/2010/main" xmlns:p15="http://schemas.microsoft.com/office/powerpoint/2012/main" xmlns:mc="http://schemas.openxmlformats.org/markup-compatibility/2006">
+<p:sld xmlns:a="http://schemas.openxmlformats.org/drawingml/2006/main" xmlns:p="http://schemas.openxmlformats.org/presentationml/2006/main" xmlns:r="http://schemas.openxmlformats.org/officeDocument/2006/relationships" xmlns:p14="http://schemas.microsoft.com/office/powerpoint/2010/main" xmlns:p15="http://schemas.microsoft.com/office/powerpoint/2012/main" xmlns:mc="http://schemas.openxmlformats.org/markup-compatibility/2006" show="0">
   <p:cSld>
     <p:spTree>
       <p:nvGrpSpPr>
@@ -8301,8 +8711,8 @@
         </p:nvSpPr>
         <p:spPr>
           <a:xfrm>
-            <a:off x="144000" y="71640"/>
-            <a:ext cx="9539640" cy="648360"/>
+            <a:off x="144000" y="71280"/>
+            <a:ext cx="9539280" cy="648720"/>
           </a:xfrm>
           <a:prstGeom prst="rect">
             <a:avLst/>
@@ -8335,7 +8745,7 @@
                 <a:uFillTx/>
                 <a:latin typeface="Arial"/>
               </a:rPr>
-              <a:t>7.</a:t>
+              <a:t>6.</a:t>
             </a:r>
             <a:endParaRPr b="0" lang="en-GB" sz="4400" strike="noStrike" u="none">
               <a:solidFill>
@@ -8361,7 +8771,7 @@
         <p:spPr>
           <a:xfrm>
             <a:off x="504000" y="1326600"/>
-            <a:ext cx="9071640" cy="3287880"/>
+            <a:ext cx="9071280" cy="3287520"/>
           </a:xfrm>
           <a:prstGeom prst="rect">
             <a:avLst/>
@@ -8400,7 +8810,51 @@
                 <a:uFillTx/>
                 <a:latin typeface="Arial"/>
               </a:rPr>
-              <a:t>As an operations engineer the automation of the deployment ensures that the latest builds of the app are pushed live quickly and efficiently to the end user.</a:t>
+              <a:t>As a data architect using </a:t>
+            </a:r>
+            <a:r>
+              <a:rPr b="0" lang="en-GB" sz="3200" strike="noStrike" u="none">
+                <a:solidFill>
+                  <a:srgbClr val="ffffff"/>
+                </a:solidFill>
+                <a:effectLst/>
+                <a:uFillTx/>
+                <a:latin typeface="Arial"/>
+              </a:rPr>
+              <a:t>the architecture </a:t>
+            </a:r>
+            <a:r>
+              <a:rPr b="0" lang="en-GB" sz="3200" strike="noStrike" u="none">
+                <a:solidFill>
+                  <a:srgbClr val="ffffff"/>
+                </a:solidFill>
+                <a:effectLst/>
+                <a:uFillTx/>
+                <a:latin typeface="Arial"/>
+              </a:rPr>
+              <a:t>monitoring tools allow for </a:t>
+            </a:r>
+            <a:r>
+              <a:rPr b="0" lang="en-GB" sz="3200" strike="noStrike" u="none">
+                <a:solidFill>
+                  <a:srgbClr val="ffffff"/>
+                </a:solidFill>
+                <a:effectLst/>
+                <a:uFillTx/>
+                <a:latin typeface="Arial"/>
+              </a:rPr>
+              <a:t>future improvements to </a:t>
+            </a:r>
+            <a:r>
+              <a:rPr b="0" lang="en-GB" sz="3200" strike="noStrike" u="none">
+                <a:solidFill>
+                  <a:srgbClr val="ffffff"/>
+                </a:solidFill>
+                <a:effectLst/>
+                <a:uFillTx/>
+                <a:latin typeface="Arial"/>
+              </a:rPr>
+              <a:t>the system.</a:t>
             </a:r>
             <a:endParaRPr b="0" lang="en-GB" sz="3200" strike="noStrike" u="none">
               <a:solidFill>

</xml_diff>